<commit_message>
Notes added to slides in the Lessons Learned pptx file.
</commit_message>
<xml_diff>
--- a/Lessons_Learned_ESRI_javascript_API.pptx
+++ b/Lessons_Learned_ESRI_javascript_API.pptx
@@ -2,27 +2,27 @@
 <file path=ppt/presentation.xml><?xml version="1.0" encoding="utf-8"?>
 <p:presentation xmlns:a="http://schemas.openxmlformats.org/drawingml/2006/main" xmlns:r="http://schemas.openxmlformats.org/officeDocument/2006/relationships" xmlns:p="http://schemas.openxmlformats.org/presentationml/2006/main" saveSubsetFonts="1">
   <p:sldMasterIdLst>
-    <p:sldMasterId id="2147483672" r:id="rId42"/>
+    <p:sldMasterId id="2147483672" r:id="rId44"/>
   </p:sldMasterIdLst>
   <p:notesMasterIdLst>
-    <p:notesMasterId r:id="rId58"/>
+    <p:notesMasterId r:id="rId60"/>
   </p:notesMasterIdLst>
   <p:sldIdLst>
-    <p:sldId id="258" r:id="rId43"/>
-    <p:sldId id="257" r:id="rId44"/>
-    <p:sldId id="264" r:id="rId45"/>
-    <p:sldId id="256" r:id="rId46"/>
-    <p:sldId id="259" r:id="rId47"/>
-    <p:sldId id="260" r:id="rId48"/>
-    <p:sldId id="261" r:id="rId49"/>
-    <p:sldId id="266" r:id="rId50"/>
-    <p:sldId id="269" r:id="rId51"/>
-    <p:sldId id="265" r:id="rId52"/>
-    <p:sldId id="267" r:id="rId53"/>
-    <p:sldId id="270" r:id="rId54"/>
-    <p:sldId id="263" r:id="rId55"/>
-    <p:sldId id="268" r:id="rId56"/>
-    <p:sldId id="262" r:id="rId57"/>
+    <p:sldId id="258" r:id="rId45"/>
+    <p:sldId id="257" r:id="rId46"/>
+    <p:sldId id="264" r:id="rId47"/>
+    <p:sldId id="256" r:id="rId48"/>
+    <p:sldId id="259" r:id="rId49"/>
+    <p:sldId id="260" r:id="rId50"/>
+    <p:sldId id="261" r:id="rId51"/>
+    <p:sldId id="266" r:id="rId52"/>
+    <p:sldId id="269" r:id="rId53"/>
+    <p:sldId id="265" r:id="rId54"/>
+    <p:sldId id="267" r:id="rId55"/>
+    <p:sldId id="270" r:id="rId56"/>
+    <p:sldId id="263" r:id="rId57"/>
+    <p:sldId id="268" r:id="rId58"/>
+    <p:sldId id="262" r:id="rId59"/>
   </p:sldIdLst>
   <p:sldSz cx="9144000" cy="6858000" type="screen4x3"/>
   <p:notesSz cx="6858000" cy="9144000"/>
@@ -206,7 +206,7 @@
           <a:p>
             <a:fld id="{03505E67-28AD-4078-B7F6-A6669198553D}" type="datetimeFigureOut">
               <a:rPr lang="en-US" smtClean="0"/>
-              <a:t>4/10/2015</a:t>
+              <a:t>4/13/2015</a:t>
             </a:fld>
             <a:endParaRPr lang="en-US"/>
           </a:p>
@@ -524,13 +524,37 @@
             </a:r>
             <a:r>
               <a:rPr lang="en-US" baseline="0" dirty="0" smtClean="0"/>
-              <a:t> I took this stuff on largely on my own so there were setbacks (like launching w/o keeping IT in the loop).</a:t>
+              <a:t> </a:t>
+            </a:r>
+            <a:r>
+              <a:rPr lang="en-US" i="1" baseline="0" dirty="0" smtClean="0"/>
+              <a:t>Explain</a:t>
+            </a:r>
+            <a:r>
+              <a:rPr lang="en-US" i="1" dirty="0" smtClean="0"/>
+              <a:t> the title</a:t>
+            </a:r>
+            <a:r>
+              <a:rPr lang="en-US" dirty="0" smtClean="0"/>
+              <a:t>. </a:t>
+            </a:r>
+            <a:r>
+              <a:rPr lang="en-US" baseline="0" dirty="0" smtClean="0"/>
+              <a:t>I </a:t>
+            </a:r>
+            <a:r>
+              <a:rPr lang="en-US" baseline="0" dirty="0" smtClean="0"/>
+              <a:t>took this stuff on largely on my own so there were setbacks (like launching w/o keeping IT in the loop).</a:t>
             </a:r>
           </a:p>
           <a:p>
             <a:r>
               <a:rPr lang="en-US" baseline="0" dirty="0" smtClean="0"/>
               <a:t>My maps tend to look a lot like the samples they were taken from. </a:t>
+            </a:r>
+            <a:r>
+              <a:rPr lang="en-US" baseline="0" dirty="0" smtClean="0"/>
+              <a:t>Standardization needed.</a:t>
             </a:r>
             <a:endParaRPr lang="en-US" dirty="0"/>
           </a:p>
@@ -618,31 +642,11 @@
           <a:p>
             <a:r>
               <a:rPr lang="en-US" dirty="0" smtClean="0"/>
-              <a:t>I’ve seen samples that use a dojo</a:t>
+              <a:t>Code base was getting longer</a:t>
             </a:r>
             <a:r>
               <a:rPr lang="en-US" baseline="0" dirty="0" smtClean="0"/>
-              <a:t> “deferred” callback to split click events into two possible services. I was unable to get that to work.</a:t>
-            </a:r>
-          </a:p>
-          <a:p>
-            <a:r>
-              <a:rPr lang="en-US" baseline="0" dirty="0" smtClean="0"/>
-              <a:t>I don’t know if the </a:t>
-            </a:r>
-            <a:r>
-              <a:rPr lang="en-US" baseline="0" dirty="0" err="1" smtClean="0"/>
-              <a:t>iMap</a:t>
-            </a:r>
-            <a:r>
-              <a:rPr lang="en-US" baseline="0" dirty="0" smtClean="0"/>
-              <a:t> geocoder can be used like the one I use in the map?</a:t>
-            </a:r>
-          </a:p>
-          <a:p>
-            <a:r>
-              <a:rPr lang="en-US" baseline="0" dirty="0" smtClean="0"/>
-              <a:t>I’ve got the Print Service working (though it could be more customized) but have not made my own geometry service.</a:t>
+              <a:t> (line 850 ?) and more involved (code stops working). Also I didn’t need all functionality in one map. But I DID want a unified mapping experience.</a:t>
             </a:r>
             <a:endParaRPr lang="en-US" dirty="0"/>
           </a:p>
@@ -665,7 +669,7 @@
           <a:p>
             <a:fld id="{257A954F-A6B4-48E5-8D4A-B654F238FE53}" type="slidenum">
               <a:rPr lang="en-US" smtClean="0"/>
-              <a:t>14</a:t>
+              <a:t>10</a:t>
             </a:fld>
             <a:endParaRPr lang="en-US"/>
           </a:p>
@@ -674,7 +678,7 @@
     </p:spTree>
     <p:extLst>
       <p:ext uri="{BB962C8B-B14F-4D97-AF65-F5344CB8AC3E}">
-        <p14:creationId xmlns:p14="http://schemas.microsoft.com/office/powerpoint/2010/main" val="874592069"/>
+        <p14:creationId xmlns:p14="http://schemas.microsoft.com/office/powerpoint/2010/main" val="3959707575"/>
       </p:ext>
     </p:extLst>
   </p:cSld>
@@ -730,6 +734,555 @@
           <a:p>
             <a:r>
               <a:rPr lang="en-US" dirty="0" smtClean="0"/>
+              <a:t>I’ve passed</a:t>
+            </a:r>
+            <a:r>
+              <a:rPr lang="en-US" baseline="0" dirty="0" smtClean="0"/>
+              <a:t> in variables “across the wire” before with $_GET. Having one map that does only one thing could be an advantage and being able to access each map from the other maps enhances that “unified experience” that I mentioned.</a:t>
+            </a:r>
+            <a:endParaRPr lang="en-US" dirty="0"/>
+          </a:p>
+        </p:txBody>
+      </p:sp>
+      <p:sp>
+        <p:nvSpPr>
+          <p:cNvPr id="4" name="Slide Number Placeholder 3"/>
+          <p:cNvSpPr>
+            <a:spLocks noGrp="1"/>
+          </p:cNvSpPr>
+          <p:nvPr>
+            <p:ph type="sldNum" sz="quarter" idx="10"/>
+          </p:nvPr>
+        </p:nvSpPr>
+        <p:spPr/>
+        <p:txBody>
+          <a:bodyPr/>
+          <a:lstStyle/>
+          <a:p>
+            <a:fld id="{257A954F-A6B4-48E5-8D4A-B654F238FE53}" type="slidenum">
+              <a:rPr lang="en-US" smtClean="0"/>
+              <a:t>11</a:t>
+            </a:fld>
+            <a:endParaRPr lang="en-US"/>
+          </a:p>
+        </p:txBody>
+      </p:sp>
+    </p:spTree>
+    <p:extLst>
+      <p:ext uri="{BB962C8B-B14F-4D97-AF65-F5344CB8AC3E}">
+        <p14:creationId xmlns:p14="http://schemas.microsoft.com/office/powerpoint/2010/main" val="586872709"/>
+      </p:ext>
+    </p:extLst>
+  </p:cSld>
+  <p:clrMapOvr>
+    <a:masterClrMapping/>
+  </p:clrMapOvr>
+</p:notes>
+</file>
+
+<file path=ppt/notesSlides/notesSlide12.xml><?xml version="1.0" encoding="utf-8"?>
+<p:notes xmlns:a="http://schemas.openxmlformats.org/drawingml/2006/main" xmlns:r="http://schemas.openxmlformats.org/officeDocument/2006/relationships" xmlns:p="http://schemas.openxmlformats.org/presentationml/2006/main">
+  <p:cSld>
+    <p:spTree>
+      <p:nvGrpSpPr>
+        <p:cNvPr id="1" name=""/>
+        <p:cNvGrpSpPr/>
+        <p:nvPr/>
+      </p:nvGrpSpPr>
+      <p:grpSpPr>
+        <a:xfrm>
+          <a:off x="0" y="0"/>
+          <a:ext cx="0" cy="0"/>
+          <a:chOff x="0" y="0"/>
+          <a:chExt cx="0" cy="0"/>
+        </a:xfrm>
+      </p:grpSpPr>
+      <p:sp>
+        <p:nvSpPr>
+          <p:cNvPr id="2" name="Slide Image Placeholder 1"/>
+          <p:cNvSpPr>
+            <a:spLocks noGrp="1" noRot="1" noChangeAspect="1"/>
+          </p:cNvSpPr>
+          <p:nvPr>
+            <p:ph type="sldImg"/>
+          </p:nvPr>
+        </p:nvSpPr>
+        <p:spPr/>
+      </p:sp>
+      <p:sp>
+        <p:nvSpPr>
+          <p:cNvPr id="3" name="Notes Placeholder 2"/>
+          <p:cNvSpPr>
+            <a:spLocks noGrp="1"/>
+          </p:cNvSpPr>
+          <p:nvPr>
+            <p:ph type="body" idx="1"/>
+          </p:nvPr>
+        </p:nvSpPr>
+        <p:spPr/>
+        <p:txBody>
+          <a:bodyPr/>
+          <a:lstStyle/>
+          <a:p>
+            <a:endParaRPr lang="en-US"/>
+          </a:p>
+        </p:txBody>
+      </p:sp>
+      <p:sp>
+        <p:nvSpPr>
+          <p:cNvPr id="4" name="Slide Number Placeholder 3"/>
+          <p:cNvSpPr>
+            <a:spLocks noGrp="1"/>
+          </p:cNvSpPr>
+          <p:nvPr>
+            <p:ph type="sldNum" sz="quarter" idx="10"/>
+          </p:nvPr>
+        </p:nvSpPr>
+        <p:spPr/>
+        <p:txBody>
+          <a:bodyPr/>
+          <a:lstStyle/>
+          <a:p>
+            <a:fld id="{257A954F-A6B4-48E5-8D4A-B654F238FE53}" type="slidenum">
+              <a:rPr lang="en-US" smtClean="0"/>
+              <a:t>12</a:t>
+            </a:fld>
+            <a:endParaRPr lang="en-US"/>
+          </a:p>
+        </p:txBody>
+      </p:sp>
+    </p:spTree>
+    <p:extLst>
+      <p:ext uri="{BB962C8B-B14F-4D97-AF65-F5344CB8AC3E}">
+        <p14:creationId xmlns:p14="http://schemas.microsoft.com/office/powerpoint/2010/main" val="212390502"/>
+      </p:ext>
+    </p:extLst>
+  </p:cSld>
+  <p:clrMapOvr>
+    <a:masterClrMapping/>
+  </p:clrMapOvr>
+</p:notes>
+</file>
+
+<file path=ppt/notesSlides/notesSlide13.xml><?xml version="1.0" encoding="utf-8"?>
+<p:notes xmlns:a="http://schemas.openxmlformats.org/drawingml/2006/main" xmlns:r="http://schemas.openxmlformats.org/officeDocument/2006/relationships" xmlns:p="http://schemas.openxmlformats.org/presentationml/2006/main">
+  <p:cSld>
+    <p:spTree>
+      <p:nvGrpSpPr>
+        <p:cNvPr id="1" name=""/>
+        <p:cNvGrpSpPr/>
+        <p:nvPr/>
+      </p:nvGrpSpPr>
+      <p:grpSpPr>
+        <a:xfrm>
+          <a:off x="0" y="0"/>
+          <a:ext cx="0" cy="0"/>
+          <a:chOff x="0" y="0"/>
+          <a:chExt cx="0" cy="0"/>
+        </a:xfrm>
+      </p:grpSpPr>
+      <p:sp>
+        <p:nvSpPr>
+          <p:cNvPr id="2" name="Slide Image Placeholder 1"/>
+          <p:cNvSpPr>
+            <a:spLocks noGrp="1" noRot="1" noChangeAspect="1"/>
+          </p:cNvSpPr>
+          <p:nvPr>
+            <p:ph type="sldImg"/>
+          </p:nvPr>
+        </p:nvSpPr>
+        <p:spPr/>
+      </p:sp>
+      <p:sp>
+        <p:nvSpPr>
+          <p:cNvPr id="3" name="Notes Placeholder 2"/>
+          <p:cNvSpPr>
+            <a:spLocks noGrp="1"/>
+          </p:cNvSpPr>
+          <p:nvPr>
+            <p:ph type="body" idx="1"/>
+          </p:nvPr>
+        </p:nvSpPr>
+        <p:spPr/>
+        <p:txBody>
+          <a:bodyPr/>
+          <a:lstStyle/>
+          <a:p>
+            <a:r>
+              <a:rPr lang="en-US" sz="1200" b="0" i="0" kern="1200" dirty="0" smtClean="0">
+                <a:solidFill>
+                  <a:schemeClr val="tx1"/>
+                </a:solidFill>
+                <a:effectLst/>
+                <a:latin typeface="+mn-lt"/>
+                <a:ea typeface="+mn-ea"/>
+                <a:cs typeface="+mn-cs"/>
+              </a:rPr>
+              <a:t>Live Demo of the </a:t>
+            </a:r>
+            <a:r>
+              <a:rPr lang="en-US" sz="1200" b="0" i="0" kern="1200" dirty="0" err="1" smtClean="0">
+                <a:solidFill>
+                  <a:schemeClr val="tx1"/>
+                </a:solidFill>
+                <a:effectLst/>
+                <a:latin typeface="+mn-lt"/>
+                <a:ea typeface="+mn-ea"/>
+                <a:cs typeface="+mn-cs"/>
+              </a:rPr>
+              <a:t>Webmaps</a:t>
+            </a:r>
+            <a:r>
+              <a:rPr lang="en-US" sz="1200" b="0" i="0" kern="1200" dirty="0" smtClean="0">
+                <a:solidFill>
+                  <a:schemeClr val="tx1"/>
+                </a:solidFill>
+                <a:effectLst/>
+                <a:latin typeface="+mn-lt"/>
+                <a:ea typeface="+mn-ea"/>
+                <a:cs typeface="+mn-cs"/>
+              </a:rPr>
+              <a:t> covering Navigation between maps (showing the previously mentioned </a:t>
+            </a:r>
+            <a:r>
+              <a:rPr lang="en-US" sz="1200" b="0" i="0" kern="1200" dirty="0" err="1" smtClean="0">
+                <a:solidFill>
+                  <a:schemeClr val="tx1"/>
+                </a:solidFill>
+                <a:effectLst/>
+                <a:latin typeface="+mn-lt"/>
+                <a:ea typeface="+mn-ea"/>
+                <a:cs typeface="+mn-cs"/>
+              </a:rPr>
+              <a:t>php</a:t>
+            </a:r>
+            <a:r>
+              <a:rPr lang="en-US" sz="1200" b="0" i="0" kern="1200" dirty="0" smtClean="0">
+                <a:solidFill>
+                  <a:schemeClr val="tx1"/>
+                </a:solidFill>
+                <a:effectLst/>
+                <a:latin typeface="+mn-lt"/>
+                <a:ea typeface="+mn-ea"/>
+                <a:cs typeface="+mn-cs"/>
+              </a:rPr>
+              <a:t> variables).</a:t>
+            </a:r>
+          </a:p>
+          <a:p>
+            <a:r>
+              <a:rPr lang="en-US" sz="1200" b="0" i="0" kern="1200" dirty="0" smtClean="0">
+                <a:solidFill>
+                  <a:schemeClr val="tx1"/>
+                </a:solidFill>
+                <a:effectLst/>
+                <a:latin typeface="+mn-lt"/>
+                <a:ea typeface="+mn-ea"/>
+                <a:cs typeface="+mn-cs"/>
+              </a:rPr>
+              <a:t>     PZ Map - the most comprehensive map, with "additional layers".</a:t>
+            </a:r>
+          </a:p>
+          <a:p>
+            <a:r>
+              <a:rPr lang="en-US" sz="1200" b="0" i="0" kern="1200" dirty="0" smtClean="0">
+                <a:solidFill>
+                  <a:schemeClr val="tx1"/>
+                </a:solidFill>
+                <a:effectLst/>
+                <a:latin typeface="+mn-lt"/>
+                <a:ea typeface="+mn-ea"/>
+                <a:cs typeface="+mn-cs"/>
+              </a:rPr>
+              <a:t>     Measurement map - basically works just like the sample.</a:t>
+            </a:r>
+          </a:p>
+          <a:p>
+            <a:r>
+              <a:rPr lang="en-US" sz="1200" b="0" i="0" kern="1200" dirty="0" smtClean="0">
+                <a:solidFill>
+                  <a:schemeClr val="tx1"/>
+                </a:solidFill>
+                <a:effectLst/>
+                <a:latin typeface="+mn-lt"/>
+                <a:ea typeface="+mn-ea"/>
+                <a:cs typeface="+mn-cs"/>
+              </a:rPr>
+              <a:t>     Flood Hazard map - gives some basic information about the zones (informative legend).</a:t>
+            </a:r>
+          </a:p>
+          <a:p>
+            <a:r>
+              <a:rPr lang="en-US" sz="1200" b="0" i="0" kern="1200" dirty="0" smtClean="0">
+                <a:solidFill>
+                  <a:schemeClr val="tx1"/>
+                </a:solidFill>
+                <a:effectLst/>
+                <a:latin typeface="+mn-lt"/>
+                <a:ea typeface="+mn-ea"/>
+                <a:cs typeface="+mn-cs"/>
+              </a:rPr>
+              <a:t>     Sensitive Areas map - PFA's, </a:t>
+            </a:r>
+            <a:r>
+              <a:rPr lang="en-US" sz="1200" b="0" i="0" kern="1200" dirty="0" err="1" smtClean="0">
+                <a:solidFill>
+                  <a:schemeClr val="tx1"/>
+                </a:solidFill>
+                <a:effectLst/>
+                <a:latin typeface="+mn-lt"/>
+                <a:ea typeface="+mn-ea"/>
+                <a:cs typeface="+mn-cs"/>
+              </a:rPr>
+              <a:t>Sourcewater</a:t>
+            </a:r>
+            <a:r>
+              <a:rPr lang="en-US" sz="1200" b="0" i="0" kern="1200" dirty="0" smtClean="0">
+                <a:solidFill>
+                  <a:schemeClr val="tx1"/>
+                </a:solidFill>
+                <a:effectLst/>
+                <a:latin typeface="+mn-lt"/>
+                <a:ea typeface="+mn-ea"/>
+                <a:cs typeface="+mn-cs"/>
+              </a:rPr>
+              <a:t> Protection, Protected Species.</a:t>
+            </a:r>
+          </a:p>
+          <a:p>
+            <a:r>
+              <a:rPr lang="en-US" sz="1200" b="0" i="0" kern="1200" dirty="0" smtClean="0">
+                <a:solidFill>
+                  <a:schemeClr val="tx1"/>
+                </a:solidFill>
+                <a:effectLst/>
+                <a:latin typeface="+mn-lt"/>
+                <a:ea typeface="+mn-ea"/>
+                <a:cs typeface="+mn-cs"/>
+              </a:rPr>
+              <a:t>     Printable map - providing a way for someone to make a map using only the data that they want to include.</a:t>
+            </a:r>
+          </a:p>
+          <a:p>
+            <a:r>
+              <a:rPr lang="en-US" sz="1200" b="0" i="0" kern="1200" dirty="0" smtClean="0">
+                <a:solidFill>
+                  <a:schemeClr val="tx1"/>
+                </a:solidFill>
+                <a:effectLst/>
+                <a:latin typeface="+mn-lt"/>
+                <a:ea typeface="+mn-ea"/>
+                <a:cs typeface="+mn-cs"/>
+              </a:rPr>
+              <a:t>     Go Over the Help section.</a:t>
+            </a:r>
+          </a:p>
+          <a:p>
+            <a:r>
+              <a:rPr lang="en-US" dirty="0" smtClean="0"/>
+              <a:t/>
+            </a:r>
+            <a:br>
+              <a:rPr lang="en-US" dirty="0" smtClean="0"/>
+            </a:br>
+            <a:endParaRPr lang="en-US" dirty="0"/>
+          </a:p>
+        </p:txBody>
+      </p:sp>
+      <p:sp>
+        <p:nvSpPr>
+          <p:cNvPr id="4" name="Slide Number Placeholder 3"/>
+          <p:cNvSpPr>
+            <a:spLocks noGrp="1"/>
+          </p:cNvSpPr>
+          <p:nvPr>
+            <p:ph type="sldNum" sz="quarter" idx="10"/>
+          </p:nvPr>
+        </p:nvSpPr>
+        <p:spPr/>
+        <p:txBody>
+          <a:bodyPr/>
+          <a:lstStyle/>
+          <a:p>
+            <a:fld id="{257A954F-A6B4-48E5-8D4A-B654F238FE53}" type="slidenum">
+              <a:rPr lang="en-US" smtClean="0"/>
+              <a:t>13</a:t>
+            </a:fld>
+            <a:endParaRPr lang="en-US"/>
+          </a:p>
+        </p:txBody>
+      </p:sp>
+    </p:spTree>
+    <p:extLst>
+      <p:ext uri="{BB962C8B-B14F-4D97-AF65-F5344CB8AC3E}">
+        <p14:creationId xmlns:p14="http://schemas.microsoft.com/office/powerpoint/2010/main" val="1597644097"/>
+      </p:ext>
+    </p:extLst>
+  </p:cSld>
+  <p:clrMapOvr>
+    <a:masterClrMapping/>
+  </p:clrMapOvr>
+</p:notes>
+</file>
+
+<file path=ppt/notesSlides/notesSlide14.xml><?xml version="1.0" encoding="utf-8"?>
+<p:notes xmlns:a="http://schemas.openxmlformats.org/drawingml/2006/main" xmlns:r="http://schemas.openxmlformats.org/officeDocument/2006/relationships" xmlns:p="http://schemas.openxmlformats.org/presentationml/2006/main">
+  <p:cSld>
+    <p:spTree>
+      <p:nvGrpSpPr>
+        <p:cNvPr id="1" name=""/>
+        <p:cNvGrpSpPr/>
+        <p:nvPr/>
+      </p:nvGrpSpPr>
+      <p:grpSpPr>
+        <a:xfrm>
+          <a:off x="0" y="0"/>
+          <a:ext cx="0" cy="0"/>
+          <a:chOff x="0" y="0"/>
+          <a:chExt cx="0" cy="0"/>
+        </a:xfrm>
+      </p:grpSpPr>
+      <p:sp>
+        <p:nvSpPr>
+          <p:cNvPr id="2" name="Slide Image Placeholder 1"/>
+          <p:cNvSpPr>
+            <a:spLocks noGrp="1" noRot="1" noChangeAspect="1"/>
+          </p:cNvSpPr>
+          <p:nvPr>
+            <p:ph type="sldImg"/>
+          </p:nvPr>
+        </p:nvSpPr>
+        <p:spPr/>
+      </p:sp>
+      <p:sp>
+        <p:nvSpPr>
+          <p:cNvPr id="3" name="Notes Placeholder 2"/>
+          <p:cNvSpPr>
+            <a:spLocks noGrp="1"/>
+          </p:cNvSpPr>
+          <p:nvPr>
+            <p:ph type="body" idx="1"/>
+          </p:nvPr>
+        </p:nvSpPr>
+        <p:spPr/>
+        <p:txBody>
+          <a:bodyPr/>
+          <a:lstStyle/>
+          <a:p>
+            <a:r>
+              <a:rPr lang="en-US" dirty="0" smtClean="0"/>
+              <a:t>I’ve seen samples that use a dojo</a:t>
+            </a:r>
+            <a:r>
+              <a:rPr lang="en-US" baseline="0" dirty="0" smtClean="0"/>
+              <a:t> “deferred” callback to split click events into two possible services. I was unable to get that to work.</a:t>
+            </a:r>
+          </a:p>
+          <a:p>
+            <a:r>
+              <a:rPr lang="en-US" baseline="0" dirty="0" smtClean="0"/>
+              <a:t>I don’t know if the </a:t>
+            </a:r>
+            <a:r>
+              <a:rPr lang="en-US" baseline="0" dirty="0" err="1" smtClean="0"/>
+              <a:t>iMap</a:t>
+            </a:r>
+            <a:r>
+              <a:rPr lang="en-US" baseline="0" dirty="0" smtClean="0"/>
+              <a:t> geocoder can be used like the one I use in the map?</a:t>
+            </a:r>
+          </a:p>
+          <a:p>
+            <a:r>
+              <a:rPr lang="en-US" baseline="0" dirty="0" smtClean="0"/>
+              <a:t>I’ve got the Print Service working (though it could be more customized) but have not made my own geometry service.</a:t>
+            </a:r>
+            <a:endParaRPr lang="en-US" dirty="0"/>
+          </a:p>
+        </p:txBody>
+      </p:sp>
+      <p:sp>
+        <p:nvSpPr>
+          <p:cNvPr id="4" name="Slide Number Placeholder 3"/>
+          <p:cNvSpPr>
+            <a:spLocks noGrp="1"/>
+          </p:cNvSpPr>
+          <p:nvPr>
+            <p:ph type="sldNum" sz="quarter" idx="10"/>
+          </p:nvPr>
+        </p:nvSpPr>
+        <p:spPr/>
+        <p:txBody>
+          <a:bodyPr/>
+          <a:lstStyle/>
+          <a:p>
+            <a:fld id="{257A954F-A6B4-48E5-8D4A-B654F238FE53}" type="slidenum">
+              <a:rPr lang="en-US" smtClean="0"/>
+              <a:t>14</a:t>
+            </a:fld>
+            <a:endParaRPr lang="en-US"/>
+          </a:p>
+        </p:txBody>
+      </p:sp>
+    </p:spTree>
+    <p:extLst>
+      <p:ext uri="{BB962C8B-B14F-4D97-AF65-F5344CB8AC3E}">
+        <p14:creationId xmlns:p14="http://schemas.microsoft.com/office/powerpoint/2010/main" val="874592069"/>
+      </p:ext>
+    </p:extLst>
+  </p:cSld>
+  <p:clrMapOvr>
+    <a:masterClrMapping/>
+  </p:clrMapOvr>
+</p:notes>
+</file>
+
+<file path=ppt/notesSlides/notesSlide15.xml><?xml version="1.0" encoding="utf-8"?>
+<p:notes xmlns:a="http://schemas.openxmlformats.org/drawingml/2006/main" xmlns:r="http://schemas.openxmlformats.org/officeDocument/2006/relationships" xmlns:p="http://schemas.openxmlformats.org/presentationml/2006/main">
+  <p:cSld>
+    <p:spTree>
+      <p:nvGrpSpPr>
+        <p:cNvPr id="1" name=""/>
+        <p:cNvGrpSpPr/>
+        <p:nvPr/>
+      </p:nvGrpSpPr>
+      <p:grpSpPr>
+        <a:xfrm>
+          <a:off x="0" y="0"/>
+          <a:ext cx="0" cy="0"/>
+          <a:chOff x="0" y="0"/>
+          <a:chExt cx="0" cy="0"/>
+        </a:xfrm>
+      </p:grpSpPr>
+      <p:sp>
+        <p:nvSpPr>
+          <p:cNvPr id="2" name="Slide Image Placeholder 1"/>
+          <p:cNvSpPr>
+            <a:spLocks noGrp="1" noRot="1" noChangeAspect="1"/>
+          </p:cNvSpPr>
+          <p:nvPr>
+            <p:ph type="sldImg"/>
+          </p:nvPr>
+        </p:nvSpPr>
+        <p:spPr/>
+      </p:sp>
+      <p:sp>
+        <p:nvSpPr>
+          <p:cNvPr id="3" name="Notes Placeholder 2"/>
+          <p:cNvSpPr>
+            <a:spLocks noGrp="1"/>
+          </p:cNvSpPr>
+          <p:nvPr>
+            <p:ph type="body" idx="1"/>
+          </p:nvPr>
+        </p:nvSpPr>
+        <p:spPr/>
+        <p:txBody>
+          <a:bodyPr/>
+          <a:lstStyle/>
+          <a:p>
+            <a:r>
+              <a:rPr lang="en-US" dirty="0" smtClean="0"/>
               <a:t>Is the ESRI </a:t>
             </a:r>
             <a:r>
@@ -828,22 +1381,7 @@
           <a:bodyPr/>
           <a:lstStyle/>
           <a:p>
-            <a:r>
-              <a:rPr lang="en-US" dirty="0" smtClean="0"/>
-              <a:t>I</a:t>
-            </a:r>
-            <a:r>
-              <a:rPr lang="en-US" baseline="0" dirty="0" smtClean="0"/>
-              <a:t> learned that programming comes in handy when a Triangulation Program creates an output that is not exactly what is needed for input to a Home Range Program the creates output that is not exactly what is needed as input to GIS … and so on. I wrote QBASIC programs to help that workflow (stuff I would probably do with Perl or Python anymore). I really got into the programming and even wrote some extensions for ArcMap and did some cool Hydrologic Modeling stuff in Python for my contract with USGS.</a:t>
-            </a:r>
-            <a:endParaRPr lang="en-US" dirty="0" smtClean="0"/>
-          </a:p>
-          <a:p>
-            <a:r>
-              <a:rPr lang="en-US" dirty="0" smtClean="0"/>
-              <a:t>I also like wearing cool T-shirts.</a:t>
-            </a:r>
-            <a:endParaRPr lang="en-US" dirty="0"/>
+            <a:endParaRPr lang="en-US"/>
           </a:p>
         </p:txBody>
       </p:sp>
@@ -864,7 +1402,7 @@
           <a:p>
             <a:fld id="{257A954F-A6B4-48E5-8D4A-B654F238FE53}" type="slidenum">
               <a:rPr lang="en-US" smtClean="0"/>
-              <a:t>3</a:t>
+              <a:t>2</a:t>
             </a:fld>
             <a:endParaRPr lang="en-US"/>
           </a:p>
@@ -873,7 +1411,7 @@
     </p:spTree>
     <p:extLst>
       <p:ext uri="{BB962C8B-B14F-4D97-AF65-F5344CB8AC3E}">
-        <p14:creationId xmlns:p14="http://schemas.microsoft.com/office/powerpoint/2010/main" val="1541453130"/>
+        <p14:creationId xmlns:p14="http://schemas.microsoft.com/office/powerpoint/2010/main" val="2633888157"/>
       </p:ext>
     </p:extLst>
   </p:cSld>
@@ -929,41 +1467,18 @@
           <a:p>
             <a:r>
               <a:rPr lang="en-US" dirty="0" smtClean="0"/>
-              <a:t>A</a:t>
+              <a:t>I</a:t>
             </a:r>
             <a:r>
               <a:rPr lang="en-US" baseline="0" dirty="0" smtClean="0"/>
-              <a:t> few options – ArcGIS Server already installed – Lots of samples available for the ArcGIS </a:t>
-            </a:r>
-            <a:r>
-              <a:rPr lang="en-US" baseline="0" dirty="0" err="1" smtClean="0"/>
-              <a:t>javascript</a:t>
-            </a:r>
-            <a:r>
-              <a:rPr lang="en-US" baseline="0" dirty="0" smtClean="0"/>
-              <a:t> API.</a:t>
-            </a:r>
-          </a:p>
-          <a:p>
-            <a:r>
-              <a:rPr lang="en-US" baseline="0" dirty="0" smtClean="0"/>
-              <a:t>Leaflet is thought to be more lightweight (</a:t>
-            </a:r>
-            <a:r>
-              <a:rPr lang="en-US" baseline="0" dirty="0" err="1" smtClean="0"/>
-              <a:t>OpenLayers</a:t>
-            </a:r>
-            <a:r>
-              <a:rPr lang="en-US" baseline="0" dirty="0" smtClean="0"/>
-              <a:t> may be too). I have used </a:t>
-            </a:r>
-            <a:r>
-              <a:rPr lang="en-US" baseline="0" dirty="0" err="1" smtClean="0"/>
-              <a:t>MapServer</a:t>
-            </a:r>
-            <a:r>
-              <a:rPr lang="en-US" baseline="0" dirty="0" smtClean="0"/>
-              <a:t> and currently test my maps using MS4W.</a:t>
+              <a:t> learned that programming comes in handy when a Triangulation Program creates an output that is not exactly what is needed for input to a Home Range Program the creates output that is not exactly what is needed as input to GIS … and so on. I wrote QBASIC programs to help that workflow (stuff I would probably do with Perl or Python anymore). I really got into the programming and even wrote some extensions for ArcMap and did some cool Hydrologic Modeling stuff in Python for my contract with USGS.</a:t>
+            </a:r>
+            <a:endParaRPr lang="en-US" dirty="0" smtClean="0"/>
+          </a:p>
+          <a:p>
+            <a:r>
+              <a:rPr lang="en-US" dirty="0" smtClean="0"/>
+              <a:t>I also like wearing cool T-shirts.</a:t>
             </a:r>
             <a:endParaRPr lang="en-US" dirty="0"/>
           </a:p>
@@ -986,7 +1501,7 @@
           <a:p>
             <a:fld id="{257A954F-A6B4-48E5-8D4A-B654F238FE53}" type="slidenum">
               <a:rPr lang="en-US" smtClean="0"/>
-              <a:t>4</a:t>
+              <a:t>3</a:t>
             </a:fld>
             <a:endParaRPr lang="en-US"/>
           </a:p>
@@ -995,7 +1510,7 @@
     </p:spTree>
     <p:extLst>
       <p:ext uri="{BB962C8B-B14F-4D97-AF65-F5344CB8AC3E}">
-        <p14:creationId xmlns:p14="http://schemas.microsoft.com/office/powerpoint/2010/main" val="1229757218"/>
+        <p14:creationId xmlns:p14="http://schemas.microsoft.com/office/powerpoint/2010/main" val="1541453130"/>
       </p:ext>
     </p:extLst>
   </p:cSld>
@@ -1051,23 +1566,41 @@
           <a:p>
             <a:r>
               <a:rPr lang="en-US" dirty="0" smtClean="0"/>
-              <a:t>After create some code</a:t>
+              <a:t>A</a:t>
             </a:r>
             <a:r>
               <a:rPr lang="en-US" baseline="0" dirty="0" smtClean="0"/>
-              <a:t> in NP++, I want to check to see if it is good. </a:t>
-            </a:r>
-            <a:r>
-              <a:rPr lang="en-US" dirty="0" err="1" smtClean="0"/>
-              <a:t>Jslint</a:t>
-            </a:r>
-            <a:r>
-              <a:rPr lang="en-US" dirty="0" smtClean="0"/>
-              <a:t> is picky but has lots of options</a:t>
+              <a:t> few options – ArcGIS Server already installed – Lots of samples available for the ArcGIS </a:t>
+            </a:r>
+            <a:r>
+              <a:rPr lang="en-US" baseline="0" dirty="0" err="1" smtClean="0"/>
+              <a:t>javascript</a:t>
             </a:r>
             <a:r>
               <a:rPr lang="en-US" baseline="0" dirty="0" smtClean="0"/>
-              <a:t> for customization.</a:t>
+              <a:t> API.</a:t>
+            </a:r>
+          </a:p>
+          <a:p>
+            <a:r>
+              <a:rPr lang="en-US" baseline="0" dirty="0" smtClean="0"/>
+              <a:t>Leaflet is thought to be more lightweight (</a:t>
+            </a:r>
+            <a:r>
+              <a:rPr lang="en-US" baseline="0" dirty="0" err="1" smtClean="0"/>
+              <a:t>OpenLayers</a:t>
+            </a:r>
+            <a:r>
+              <a:rPr lang="en-US" baseline="0" dirty="0" smtClean="0"/>
+              <a:t> may be too). I have used </a:t>
+            </a:r>
+            <a:r>
+              <a:rPr lang="en-US" baseline="0" dirty="0" err="1" smtClean="0"/>
+              <a:t>MapServer</a:t>
+            </a:r>
+            <a:r>
+              <a:rPr lang="en-US" baseline="0" dirty="0" smtClean="0"/>
+              <a:t> and currently test my maps using MS4W.</a:t>
             </a:r>
             <a:endParaRPr lang="en-US" dirty="0"/>
           </a:p>
@@ -1090,7 +1623,7 @@
           <a:p>
             <a:fld id="{257A954F-A6B4-48E5-8D4A-B654F238FE53}" type="slidenum">
               <a:rPr lang="en-US" smtClean="0"/>
-              <a:t>7</a:t>
+              <a:t>4</a:t>
             </a:fld>
             <a:endParaRPr lang="en-US"/>
           </a:p>
@@ -1099,7 +1632,7 @@
     </p:spTree>
     <p:extLst>
       <p:ext uri="{BB962C8B-B14F-4D97-AF65-F5344CB8AC3E}">
-        <p14:creationId xmlns:p14="http://schemas.microsoft.com/office/powerpoint/2010/main" val="3749411674"/>
+        <p14:creationId xmlns:p14="http://schemas.microsoft.com/office/powerpoint/2010/main" val="1229757218"/>
       </p:ext>
     </p:extLst>
   </p:cSld>
@@ -1154,15 +1687,32 @@
           <a:lstStyle/>
           <a:p>
             <a:r>
-              <a:rPr lang="en-US" dirty="0" err="1" smtClean="0"/>
-              <a:t>Compressorator</a:t>
-            </a:r>
-            <a:r>
               <a:rPr lang="en-US" dirty="0" smtClean="0"/>
-              <a:t> asks “which tool is best?” which is a complicated question.</a:t>
-            </a:r>
+              <a:t>Allows you to go back if you totally destroy something.</a:t>
+            </a:r>
+          </a:p>
+          <a:p>
+            <a:r>
+              <a:rPr lang="en-US" dirty="0" smtClean="0"/>
+              <a:t>Allows you to stash changes if you think you were “on to something”.</a:t>
+            </a:r>
+          </a:p>
+          <a:p>
+            <a:r>
+              <a:rPr lang="en-US" dirty="0" smtClean="0"/>
+              <a:t>Creates a usable log of what was changed.</a:t>
+            </a:r>
+          </a:p>
+          <a:p>
             <a:endParaRPr lang="en-US" dirty="0"/>
           </a:p>
+          <a:p>
+            <a:r>
+              <a:rPr lang="en-US" dirty="0" smtClean="0"/>
+              <a:t>Took the lynda.com course, bought the pocket guide and often search for answers on online forums.</a:t>
+            </a:r>
+            <a:endParaRPr lang="en-US" dirty="0"/>
+          </a:p>
         </p:txBody>
       </p:sp>
       <p:sp>
@@ -1182,7 +1732,7 @@
           <a:p>
             <a:fld id="{257A954F-A6B4-48E5-8D4A-B654F238FE53}" type="slidenum">
               <a:rPr lang="en-US" smtClean="0"/>
-              <a:t>8</a:t>
+              <a:t>5</a:t>
             </a:fld>
             <a:endParaRPr lang="en-US"/>
           </a:p>
@@ -1191,7 +1741,7 @@
     </p:spTree>
     <p:extLst>
       <p:ext uri="{BB962C8B-B14F-4D97-AF65-F5344CB8AC3E}">
-        <p14:creationId xmlns:p14="http://schemas.microsoft.com/office/powerpoint/2010/main" val="1580621477"/>
+        <p14:creationId xmlns:p14="http://schemas.microsoft.com/office/powerpoint/2010/main" val="2090887514"/>
       </p:ext>
     </p:extLst>
   </p:cSld>
@@ -1245,27 +1795,7 @@
           <a:bodyPr/>
           <a:lstStyle/>
           <a:p>
-            <a:r>
-              <a:rPr lang="en-US" dirty="0" smtClean="0"/>
-              <a:t>Turn this into this (showing results of </a:t>
-            </a:r>
-            <a:r>
-              <a:rPr lang="en-US" dirty="0" err="1" smtClean="0"/>
-              <a:t>minification</a:t>
-            </a:r>
-            <a:r>
-              <a:rPr lang="en-US" dirty="0" smtClean="0"/>
-              <a:t>). You can see that it renames (or shortens) variables as a part of eliminating</a:t>
-            </a:r>
-            <a:r>
-              <a:rPr lang="en-US" baseline="0" dirty="0" smtClean="0"/>
-              <a:t> unneeded characters</a:t>
-            </a:r>
-            <a:r>
-              <a:rPr lang="en-US" dirty="0" smtClean="0"/>
-              <a:t>.</a:t>
-            </a:r>
-            <a:endParaRPr lang="en-US" dirty="0"/>
+            <a:endParaRPr lang="en-US"/>
           </a:p>
         </p:txBody>
       </p:sp>
@@ -1286,7 +1816,7 @@
           <a:p>
             <a:fld id="{257A954F-A6B4-48E5-8D4A-B654F238FE53}" type="slidenum">
               <a:rPr lang="en-US" smtClean="0"/>
-              <a:t>9</a:t>
+              <a:t>6</a:t>
             </a:fld>
             <a:endParaRPr lang="en-US"/>
           </a:p>
@@ -1295,7 +1825,7 @@
     </p:spTree>
     <p:extLst>
       <p:ext uri="{BB962C8B-B14F-4D97-AF65-F5344CB8AC3E}">
-        <p14:creationId xmlns:p14="http://schemas.microsoft.com/office/powerpoint/2010/main" val="2621390086"/>
+        <p14:creationId xmlns:p14="http://schemas.microsoft.com/office/powerpoint/2010/main" val="659031382"/>
       </p:ext>
     </p:extLst>
   </p:cSld>
@@ -1351,14 +1881,73 @@
           <a:p>
             <a:r>
               <a:rPr lang="en-US" dirty="0" smtClean="0"/>
-              <a:t>Code base was getting longer</a:t>
+              <a:t>After create some code</a:t>
             </a:r>
             <a:r>
               <a:rPr lang="en-US" baseline="0" dirty="0" smtClean="0"/>
-              <a:t> (line 850 ?) and more involved (code stops working). Also I didn’t need all functionality in one map. But I DID want a unified mapping experience.</a:t>
-            </a:r>
+              <a:t> in NP++, I want to check to see if it is good. </a:t>
+            </a:r>
+            <a:r>
+              <a:rPr lang="en-US" dirty="0" err="1" smtClean="0"/>
+              <a:t>Jslint</a:t>
+            </a:r>
+            <a:r>
+              <a:rPr lang="en-US" dirty="0" smtClean="0"/>
+              <a:t> is picky but has lots of options</a:t>
+            </a:r>
+            <a:r>
+              <a:rPr lang="en-US" baseline="0" dirty="0" smtClean="0"/>
+              <a:t> for customization</a:t>
+            </a:r>
+            <a:r>
+              <a:rPr lang="en-US" baseline="0" dirty="0" smtClean="0"/>
+              <a:t>.</a:t>
+            </a:r>
+          </a:p>
+          <a:p>
             <a:endParaRPr lang="en-US" dirty="0"/>
           </a:p>
+          <a:p>
+            <a:r>
+              <a:rPr lang="en-US" dirty="0" smtClean="0"/>
+              <a:t>It will let you know </a:t>
+            </a:r>
+            <a:r>
+              <a:rPr lang="en-US" dirty="0" smtClean="0"/>
+              <a:t>about …</a:t>
+            </a:r>
+          </a:p>
+          <a:p>
+            <a:endParaRPr lang="en-US" dirty="0"/>
+          </a:p>
+          <a:p>
+            <a:r>
+              <a:rPr lang="en-US" dirty="0" smtClean="0"/>
+              <a:t>Undefined variables (it even gets you to define them at the beginning).</a:t>
+            </a:r>
+          </a:p>
+          <a:p>
+            <a:r>
+              <a:rPr lang="en-US" dirty="0" smtClean="0"/>
+              <a:t>Unused variables</a:t>
+            </a:r>
+          </a:p>
+          <a:p>
+            <a:r>
+              <a:rPr lang="en-US" dirty="0" err="1" smtClean="0"/>
+              <a:t>Forgotton</a:t>
+            </a:r>
+            <a:r>
+              <a:rPr lang="en-US" dirty="0" smtClean="0"/>
+              <a:t> semicolons</a:t>
+            </a:r>
+          </a:p>
+          <a:p>
+            <a:endParaRPr lang="en-US" dirty="0" smtClean="0"/>
+          </a:p>
+          <a:p>
+            <a:endParaRPr lang="en-US" dirty="0" smtClean="0"/>
+          </a:p>
         </p:txBody>
       </p:sp>
       <p:sp>
@@ -1378,7 +1967,7 @@
           <a:p>
             <a:fld id="{257A954F-A6B4-48E5-8D4A-B654F238FE53}" type="slidenum">
               <a:rPr lang="en-US" smtClean="0"/>
-              <a:t>10</a:t>
+              <a:t>7</a:t>
             </a:fld>
             <a:endParaRPr lang="en-US"/>
           </a:p>
@@ -1387,7 +1976,7 @@
     </p:spTree>
     <p:extLst>
       <p:ext uri="{BB962C8B-B14F-4D97-AF65-F5344CB8AC3E}">
-        <p14:creationId xmlns:p14="http://schemas.microsoft.com/office/powerpoint/2010/main" val="3959707575"/>
+        <p14:creationId xmlns:p14="http://schemas.microsoft.com/office/powerpoint/2010/main" val="3749411674"/>
       </p:ext>
     </p:extLst>
   </p:cSld>
@@ -1442,12 +2031,12 @@
           <a:lstStyle/>
           <a:p>
             <a:r>
+              <a:rPr lang="en-US" dirty="0" err="1" smtClean="0"/>
+              <a:t>Compressorator</a:t>
+            </a:r>
+            <a:r>
               <a:rPr lang="en-US" dirty="0" smtClean="0"/>
-              <a:t>I’ve passed</a:t>
-            </a:r>
-            <a:r>
-              <a:rPr lang="en-US" baseline="0" dirty="0" smtClean="0"/>
-              <a:t> in variables “across the wire” before with $_GET. Having one map that does only one thing could be an advantage and being able to access each map from the other maps enhances that “unified experience” that I mentioned.</a:t>
+              <a:t> asks “which tool is best?” which is a complicated question.</a:t>
             </a:r>
             <a:endParaRPr lang="en-US" dirty="0"/>
           </a:p>
@@ -1470,7 +2059,7 @@
           <a:p>
             <a:fld id="{257A954F-A6B4-48E5-8D4A-B654F238FE53}" type="slidenum">
               <a:rPr lang="en-US" smtClean="0"/>
-              <a:t>11</a:t>
+              <a:t>8</a:t>
             </a:fld>
             <a:endParaRPr lang="en-US"/>
           </a:p>
@@ -1479,7 +2068,7 @@
     </p:spTree>
     <p:extLst>
       <p:ext uri="{BB962C8B-B14F-4D97-AF65-F5344CB8AC3E}">
-        <p14:creationId xmlns:p14="http://schemas.microsoft.com/office/powerpoint/2010/main" val="586872709"/>
+        <p14:creationId xmlns:p14="http://schemas.microsoft.com/office/powerpoint/2010/main" val="1580621477"/>
       </p:ext>
     </p:extLst>
   </p:cSld>
@@ -1534,182 +2123,25 @@
           <a:lstStyle/>
           <a:p>
             <a:r>
-              <a:rPr lang="en-US" sz="1200" b="0" i="0" kern="1200" dirty="0" smtClean="0">
-                <a:solidFill>
-                  <a:schemeClr val="tx1"/>
-                </a:solidFill>
-                <a:effectLst/>
-                <a:latin typeface="+mn-lt"/>
-                <a:ea typeface="+mn-ea"/>
-                <a:cs typeface="+mn-cs"/>
-              </a:rPr>
-              <a:t>Live Demo of the </a:t>
-            </a:r>
-            <a:r>
-              <a:rPr lang="en-US" sz="1200" b="0" i="0" kern="1200" dirty="0" err="1" smtClean="0">
-                <a:solidFill>
-                  <a:schemeClr val="tx1"/>
-                </a:solidFill>
-                <a:effectLst/>
-                <a:latin typeface="+mn-lt"/>
-                <a:ea typeface="+mn-ea"/>
-                <a:cs typeface="+mn-cs"/>
-              </a:rPr>
-              <a:t>Webmaps</a:t>
-            </a:r>
-            <a:r>
-              <a:rPr lang="en-US" sz="1200" b="0" i="0" kern="1200" dirty="0" smtClean="0">
-                <a:solidFill>
-                  <a:schemeClr val="tx1"/>
-                </a:solidFill>
-                <a:effectLst/>
-                <a:latin typeface="+mn-lt"/>
-                <a:ea typeface="+mn-ea"/>
-                <a:cs typeface="+mn-cs"/>
-              </a:rPr>
-              <a:t> covering Navigation between maps (showing the previously mentioned </a:t>
-            </a:r>
-            <a:r>
-              <a:rPr lang="en-US" sz="1200" b="0" i="0" kern="1200" dirty="0" err="1" smtClean="0">
-                <a:solidFill>
-                  <a:schemeClr val="tx1"/>
-                </a:solidFill>
-                <a:effectLst/>
-                <a:latin typeface="+mn-lt"/>
-                <a:ea typeface="+mn-ea"/>
-                <a:cs typeface="+mn-cs"/>
-              </a:rPr>
-              <a:t>php</a:t>
-            </a:r>
-            <a:r>
-              <a:rPr lang="en-US" sz="1200" b="0" i="0" kern="1200" dirty="0" smtClean="0">
-                <a:solidFill>
-                  <a:schemeClr val="tx1"/>
-                </a:solidFill>
-                <a:effectLst/>
-                <a:latin typeface="+mn-lt"/>
-                <a:ea typeface="+mn-ea"/>
-                <a:cs typeface="+mn-cs"/>
-              </a:rPr>
-              <a:t> variables).</a:t>
-            </a:r>
-          </a:p>
-          <a:p>
-            <a:r>
-              <a:rPr lang="en-US" sz="1200" b="0" i="0" kern="1200" dirty="0" smtClean="0">
-                <a:solidFill>
-                  <a:schemeClr val="tx1"/>
-                </a:solidFill>
-                <a:effectLst/>
-                <a:latin typeface="+mn-lt"/>
-                <a:ea typeface="+mn-ea"/>
-                <a:cs typeface="+mn-cs"/>
-              </a:rPr>
-              <a:t>     PZ Map - the most comprehensive map, with "additional layers".</a:t>
-            </a:r>
-          </a:p>
-          <a:p>
-            <a:r>
-              <a:rPr lang="en-US" sz="1200" b="0" i="0" kern="1200" dirty="0" smtClean="0">
-                <a:solidFill>
-                  <a:schemeClr val="tx1"/>
-                </a:solidFill>
-                <a:effectLst/>
-                <a:latin typeface="+mn-lt"/>
-                <a:ea typeface="+mn-ea"/>
-                <a:cs typeface="+mn-cs"/>
-              </a:rPr>
-              <a:t>     Measurement map - basically works just like the sample.</a:t>
-            </a:r>
-          </a:p>
-          <a:p>
-            <a:r>
-              <a:rPr lang="en-US" sz="1200" b="0" i="0" kern="1200" dirty="0" smtClean="0">
-                <a:solidFill>
-                  <a:schemeClr val="tx1"/>
-                </a:solidFill>
-                <a:effectLst/>
-                <a:latin typeface="+mn-lt"/>
-                <a:ea typeface="+mn-ea"/>
-                <a:cs typeface="+mn-cs"/>
-              </a:rPr>
-              <a:t>     Flood Hazard map - gives some basic information about the zones (informative legend).</a:t>
-            </a:r>
-          </a:p>
-          <a:p>
-            <a:r>
-              <a:rPr lang="en-US" sz="1200" b="0" i="0" kern="1200" dirty="0" smtClean="0">
-                <a:solidFill>
-                  <a:schemeClr val="tx1"/>
-                </a:solidFill>
-                <a:effectLst/>
-                <a:latin typeface="+mn-lt"/>
-                <a:ea typeface="+mn-ea"/>
-                <a:cs typeface="+mn-cs"/>
-              </a:rPr>
-              <a:t>     Sensitive Areas map - PFA's, </a:t>
-            </a:r>
-            <a:r>
-              <a:rPr lang="en-US" sz="1200" b="0" i="0" kern="1200" dirty="0" err="1" smtClean="0">
-                <a:solidFill>
-                  <a:schemeClr val="tx1"/>
-                </a:solidFill>
-                <a:effectLst/>
-                <a:latin typeface="+mn-lt"/>
-                <a:ea typeface="+mn-ea"/>
-                <a:cs typeface="+mn-cs"/>
-              </a:rPr>
-              <a:t>Sourcewater</a:t>
-            </a:r>
-            <a:r>
-              <a:rPr lang="en-US" sz="1200" b="0" i="0" kern="1200" dirty="0" smtClean="0">
-                <a:solidFill>
-                  <a:schemeClr val="tx1"/>
-                </a:solidFill>
-                <a:effectLst/>
-                <a:latin typeface="+mn-lt"/>
-                <a:ea typeface="+mn-ea"/>
-                <a:cs typeface="+mn-cs"/>
-              </a:rPr>
-              <a:t> Protection, Protected Species.</a:t>
-            </a:r>
-          </a:p>
-          <a:p>
-            <a:r>
-              <a:rPr lang="en-US" sz="1200" b="0" i="0" kern="1200" dirty="0" smtClean="0">
-                <a:solidFill>
-                  <a:schemeClr val="tx1"/>
-                </a:solidFill>
-                <a:effectLst/>
-                <a:latin typeface="+mn-lt"/>
-                <a:ea typeface="+mn-ea"/>
-                <a:cs typeface="+mn-cs"/>
-              </a:rPr>
-              <a:t>     Printable map - providing a way for someone to make a map using only the data that they want to include.</a:t>
-            </a:r>
-          </a:p>
-          <a:p>
-            <a:r>
-              <a:rPr lang="en-US" sz="1200" b="0" i="0" kern="1200" dirty="0" smtClean="0">
-                <a:solidFill>
-                  <a:schemeClr val="tx1"/>
-                </a:solidFill>
-                <a:effectLst/>
-                <a:latin typeface="+mn-lt"/>
-                <a:ea typeface="+mn-ea"/>
-                <a:cs typeface="+mn-cs"/>
-              </a:rPr>
-              <a:t>     Go Over the Help section.</a:t>
-            </a:r>
-          </a:p>
-          <a:p>
-            <a:r>
               <a:rPr lang="en-US" dirty="0" smtClean="0"/>
-              <a:t/>
-            </a:r>
-            <a:br>
+              <a:t>Turn this into this (showing results of </a:t>
+            </a:r>
+            <a:r>
+              <a:rPr lang="en-US" dirty="0" err="1" smtClean="0"/>
+              <a:t>minification</a:t>
+            </a:r>
+            <a:r>
               <a:rPr lang="en-US" dirty="0" smtClean="0"/>
-            </a:br>
+              <a:t>). You can see that it renames (or shortens) variables as a part of eliminating</a:t>
+            </a:r>
+            <a:r>
+              <a:rPr lang="en-US" baseline="0" dirty="0" smtClean="0"/>
+              <a:t> unneeded characters</a:t>
+            </a:r>
+            <a:r>
+              <a:rPr lang="en-US" dirty="0" smtClean="0"/>
+              <a:t>.</a:t>
+            </a:r>
             <a:endParaRPr lang="en-US" dirty="0"/>
           </a:p>
         </p:txBody>
@@ -1731,7 +2163,7 @@
           <a:p>
             <a:fld id="{257A954F-A6B4-48E5-8D4A-B654F238FE53}" type="slidenum">
               <a:rPr lang="en-US" smtClean="0"/>
-              <a:t>13</a:t>
+              <a:t>9</a:t>
             </a:fld>
             <a:endParaRPr lang="en-US"/>
           </a:p>
@@ -1740,7 +2172,7 @@
     </p:spTree>
     <p:extLst>
       <p:ext uri="{BB962C8B-B14F-4D97-AF65-F5344CB8AC3E}">
-        <p14:creationId xmlns:p14="http://schemas.microsoft.com/office/powerpoint/2010/main" val="1597644097"/>
+        <p14:creationId xmlns:p14="http://schemas.microsoft.com/office/powerpoint/2010/main" val="2621390086"/>
       </p:ext>
     </p:extLst>
   </p:cSld>
@@ -1944,7 +2376,7 @@
           <a:p>
             <a:fld id="{E49CC300-CAEA-4B88-BD81-ACA25B4F5071}" type="datetime1">
               <a:rPr lang="en-US" smtClean="0"/>
-              <a:t>4/10/2015</a:t>
+              <a:t>4/13/2015</a:t>
             </a:fld>
             <a:endParaRPr lang="en-US"/>
           </a:p>
@@ -2113,7 +2545,7 @@
           <a:p>
             <a:fld id="{3745BE91-E42A-4AAF-BB26-D02BE510BB1B}" type="datetime1">
               <a:rPr lang="en-US" smtClean="0"/>
-              <a:t>4/10/2015</a:t>
+              <a:t>4/13/2015</a:t>
             </a:fld>
             <a:endParaRPr lang="en-US"/>
           </a:p>
@@ -2292,7 +2724,7 @@
           <a:p>
             <a:fld id="{85932754-6618-46E8-BDA5-0CBD3094D064}" type="datetime1">
               <a:rPr lang="en-US" smtClean="0"/>
-              <a:t>4/10/2015</a:t>
+              <a:t>4/13/2015</a:t>
             </a:fld>
             <a:endParaRPr lang="en-US"/>
           </a:p>
@@ -2461,7 +2893,7 @@
           <a:p>
             <a:fld id="{E403B45D-E03C-4404-9C98-312B8AD2E868}" type="datetime1">
               <a:rPr lang="en-US" smtClean="0"/>
-              <a:t>4/10/2015</a:t>
+              <a:t>4/13/2015</a:t>
             </a:fld>
             <a:endParaRPr lang="en-US"/>
           </a:p>
@@ -2706,7 +3138,7 @@
           <a:p>
             <a:fld id="{71F2BD76-C6AD-4172-8115-134A806DAA37}" type="datetime1">
               <a:rPr lang="en-US" smtClean="0"/>
-              <a:t>4/10/2015</a:t>
+              <a:t>4/13/2015</a:t>
             </a:fld>
             <a:endParaRPr lang="en-US"/>
           </a:p>
@@ -2993,7 +3425,7 @@
           <a:p>
             <a:fld id="{D914C391-1193-487A-A813-6955BCA06797}" type="datetime1">
               <a:rPr lang="en-US" smtClean="0"/>
-              <a:t>4/10/2015</a:t>
+              <a:t>4/13/2015</a:t>
             </a:fld>
             <a:endParaRPr lang="en-US"/>
           </a:p>
@@ -3426,7 +3858,7 @@
           <a:p>
             <a:fld id="{1D8BA7DB-370E-41B0-A40A-7B552FA471B6}" type="datetime1">
               <a:rPr lang="en-US" smtClean="0"/>
-              <a:t>4/10/2015</a:t>
+              <a:t>4/13/2015</a:t>
             </a:fld>
             <a:endParaRPr lang="en-US"/>
           </a:p>
@@ -3543,7 +3975,7 @@
           <a:p>
             <a:fld id="{7DA98626-2BFD-45F5-9D52-62A2F09880E2}" type="datetime1">
               <a:rPr lang="en-US" smtClean="0"/>
-              <a:t>4/10/2015</a:t>
+              <a:t>4/13/2015</a:t>
             </a:fld>
             <a:endParaRPr lang="en-US"/>
           </a:p>
@@ -3637,7 +4069,7 @@
           <a:p>
             <a:fld id="{22B55C7B-319A-4FF3-AAF4-39360E58F7A1}" type="datetime1">
               <a:rPr lang="en-US" smtClean="0"/>
-              <a:t>4/10/2015</a:t>
+              <a:t>4/13/2015</a:t>
             </a:fld>
             <a:endParaRPr lang="en-US"/>
           </a:p>
@@ -3830,7 +4262,7 @@
           <a:p>
             <a:fld id="{0D367370-D750-4432-AC66-D72C14545BDF}" type="datetime1">
               <a:rPr lang="en-US" smtClean="0"/>
-              <a:t>4/10/2015</a:t>
+              <a:t>4/13/2015</a:t>
             </a:fld>
             <a:endParaRPr lang="en-US"/>
           </a:p>
@@ -4152,7 +4584,7 @@
           <a:p>
             <a:fld id="{EF417AFC-C7AB-4C08-885D-2ACAE3399F5D}" type="datetime1">
               <a:rPr lang="en-US" smtClean="0"/>
-              <a:t>4/10/2015</a:t>
+              <a:t>4/13/2015</a:t>
             </a:fld>
             <a:endParaRPr lang="en-US"/>
           </a:p>
@@ -4539,7 +4971,7 @@
           <a:p>
             <a:fld id="{34B9A30A-8FAE-4300-9C2E-8702CB66E234}" type="datetime1">
               <a:rPr lang="en-US" smtClean="0"/>
-              <a:t>4/10/2015</a:t>
+              <a:t>4/13/2015</a:t>
             </a:fld>
             <a:endParaRPr lang="en-US"/>
           </a:p>
@@ -5022,7 +5454,7 @@
           <a:p>
             <a:fld id="{0302782C-87D0-4478-85B8-4E9C8400ABB7}" type="datetime1">
               <a:rPr lang="en-US" smtClean="0"/>
-              <a:t>4/10/2015</a:t>
+              <a:t>4/13/2015</a:t>
             </a:fld>
             <a:endParaRPr lang="en-US" dirty="0"/>
           </a:p>
@@ -5265,7 +5697,7 @@
           <a:p>
             <a:fld id="{E403B45D-E03C-4404-9C98-312B8AD2E868}" type="datetime1">
               <a:rPr lang="en-US" smtClean="0"/>
-              <a:t>4/10/2015</a:t>
+              <a:t>4/13/2015</a:t>
             </a:fld>
             <a:endParaRPr lang="en-US"/>
           </a:p>
@@ -5414,6 +5846,13 @@
   <p:clrMapOvr>
     <a:masterClrMapping/>
   </p:clrMapOvr>
+  <p:timing>
+    <p:tnLst>
+      <p:par>
+        <p:cTn id="1" dur="indefinite" restart="never" nodeType="tmRoot"/>
+      </p:par>
+    </p:tnLst>
+  </p:timing>
 </p:sld>
 </file>
 
@@ -5522,7 +5961,7 @@
           <a:p>
             <a:fld id="{E403B45D-E03C-4404-9C98-312B8AD2E868}" type="datetime1">
               <a:rPr lang="en-US" smtClean="0"/>
-              <a:t>4/10/2015</a:t>
+              <a:t>4/13/2015</a:t>
             </a:fld>
             <a:endParaRPr lang="en-US"/>
           </a:p>
@@ -5671,6 +6110,13 @@
   <p:clrMapOvr>
     <a:masterClrMapping/>
   </p:clrMapOvr>
+  <p:timing>
+    <p:tnLst>
+      <p:par>
+        <p:cTn id="1" dur="indefinite" restart="never" nodeType="tmRoot"/>
+      </p:par>
+    </p:tnLst>
+  </p:timing>
 </p:sld>
 </file>
 
@@ -5731,7 +6177,7 @@
           <a:p>
             <a:fld id="{E403B45D-E03C-4404-9C98-312B8AD2E868}" type="datetime1">
               <a:rPr lang="en-US" smtClean="0"/>
-              <a:t>4/10/2015</a:t>
+              <a:t>4/13/2015</a:t>
             </a:fld>
             <a:endParaRPr lang="en-US"/>
           </a:p>
@@ -5831,7 +6277,7 @@
           <p:nvPr/>
         </p:nvPicPr>
         <p:blipFill>
-          <a:blip r:embed="rId2">
+          <a:blip r:embed="rId3">
             <a:extLst>
               <a:ext uri="{28A0092B-C50C-407E-A947-70E740481C1C}">
                 <a14:useLocalDpi xmlns:a14="http://schemas.microsoft.com/office/drawing/2010/main" val="0"/>
@@ -5880,7 +6326,7 @@
           <p:nvPr/>
         </p:nvPicPr>
         <p:blipFill>
-          <a:blip r:embed="rId3">
+          <a:blip r:embed="rId4">
             <a:extLst>
               <a:ext uri="{28A0092B-C50C-407E-A947-70E740481C1C}">
                 <a14:useLocalDpi xmlns:a14="http://schemas.microsoft.com/office/drawing/2010/main" val="0"/>
@@ -5929,7 +6375,7 @@
           <p:nvPr/>
         </p:nvPicPr>
         <p:blipFill>
-          <a:blip r:embed="rId4">
+          <a:blip r:embed="rId5">
             <a:extLst>
               <a:ext uri="{28A0092B-C50C-407E-A947-70E740481C1C}">
                 <a14:useLocalDpi xmlns:a14="http://schemas.microsoft.com/office/drawing/2010/main" val="0"/>
@@ -6147,6 +6593,13 @@
   <p:clrMapOvr>
     <a:masterClrMapping/>
   </p:clrMapOvr>
+  <p:timing>
+    <p:tnLst>
+      <p:par>
+        <p:cTn id="1" dur="indefinite" restart="never" nodeType="tmRoot"/>
+      </p:par>
+    </p:tnLst>
+  </p:timing>
 </p:sld>
 </file>
 
@@ -6226,7 +6679,7 @@
           <a:p>
             <a:fld id="{E403B45D-E03C-4404-9C98-312B8AD2E868}" type="datetime1">
               <a:rPr lang="en-US" smtClean="0"/>
-              <a:t>4/10/2015</a:t>
+              <a:t>4/13/2015</a:t>
             </a:fld>
             <a:endParaRPr lang="en-US"/>
           </a:p>
@@ -6326,6 +6779,13 @@
   <p:clrMapOvr>
     <a:masterClrMapping/>
   </p:clrMapOvr>
+  <p:timing>
+    <p:tnLst>
+      <p:par>
+        <p:cTn id="1" dur="indefinite" restart="never" nodeType="tmRoot"/>
+      </p:par>
+    </p:tnLst>
+  </p:timing>
 </p:sld>
 </file>
 
@@ -6480,7 +6940,7 @@
           <a:p>
             <a:fld id="{E403B45D-E03C-4404-9C98-312B8AD2E868}" type="datetime1">
               <a:rPr lang="en-US" smtClean="0"/>
-              <a:t>4/10/2015</a:t>
+              <a:t>4/13/2015</a:t>
             </a:fld>
             <a:endParaRPr lang="en-US"/>
           </a:p>
@@ -6580,6 +7040,13 @@
   <p:clrMapOvr>
     <a:masterClrMapping/>
   </p:clrMapOvr>
+  <p:timing>
+    <p:tnLst>
+      <p:par>
+        <p:cTn id="1" dur="indefinite" restart="never" nodeType="tmRoot"/>
+      </p:par>
+    </p:tnLst>
+  </p:timing>
 </p:sld>
 </file>
 
@@ -6617,11 +7084,7 @@
           <a:p>
             <a:r>
               <a:rPr lang="en-US" dirty="0" smtClean="0"/>
-              <a:t>Easy </a:t>
-            </a:r>
-            <a:r>
-              <a:rPr lang="en-US" dirty="0" smtClean="0"/>
-              <a:t>? …</a:t>
+              <a:t>Easy ? …</a:t>
             </a:r>
             <a:endParaRPr lang="en-US" dirty="0"/>
           </a:p>
@@ -6644,7 +7107,7 @@
           <a:p>
             <a:fld id="{E403B45D-E03C-4404-9C98-312B8AD2E868}" type="datetime1">
               <a:rPr lang="en-US" smtClean="0"/>
-              <a:t>4/10/2015</a:t>
+              <a:t>4/13/2015</a:t>
             </a:fld>
             <a:endParaRPr lang="en-US"/>
           </a:p>
@@ -7112,6 +7575,13 @@
   <p:clrMapOvr>
     <a:masterClrMapping/>
   </p:clrMapOvr>
+  <p:timing>
+    <p:tnLst>
+      <p:par>
+        <p:cTn id="1" dur="indefinite" restart="never" nodeType="tmRoot"/>
+      </p:par>
+    </p:tnLst>
+  </p:timing>
 </p:sld>
 </file>
 
@@ -7141,7 +7611,7 @@
           <p:nvPr/>
         </p:nvPicPr>
         <p:blipFill>
-          <a:blip r:embed="rId2" cstate="print">
+          <a:blip r:embed="rId3" cstate="print">
             <a:extLst>
               <a:ext uri="{28A0092B-C50C-407E-A947-70E740481C1C}">
                 <a14:useLocalDpi xmlns:a14="http://schemas.microsoft.com/office/drawing/2010/main" val="0"/>
@@ -7195,7 +7665,7 @@
           <p:nvPr/>
         </p:nvPicPr>
         <p:blipFill>
-          <a:blip r:embed="rId3" cstate="print">
+          <a:blip r:embed="rId4" cstate="print">
             <a:extLst>
               <a:ext uri="{28A0092B-C50C-407E-A947-70E740481C1C}">
                 <a14:useLocalDpi xmlns:a14="http://schemas.microsoft.com/office/drawing/2010/main" val="0"/>
@@ -7387,7 +7857,7 @@
           <a:p>
             <a:fld id="{8668D83A-7F5E-41DA-8AAA-3A38E79B858E}" type="datetime1">
               <a:rPr lang="en-US" smtClean="0"/>
-              <a:t>4/10/2015</a:t>
+              <a:t>4/13/2015</a:t>
             </a:fld>
             <a:endParaRPr lang="en-US"/>
           </a:p>
@@ -7402,7 +7872,7 @@
           <p:nvPr/>
         </p:nvPicPr>
         <p:blipFill>
-          <a:blip r:embed="rId4">
+          <a:blip r:embed="rId5">
             <a:extLst>
               <a:ext uri="{28A0092B-C50C-407E-A947-70E740481C1C}">
                 <a14:useLocalDpi xmlns:a14="http://schemas.microsoft.com/office/drawing/2010/main" val="0"/>
@@ -7469,7 +7939,7 @@
             <a:avLst/>
           </a:prstGeom>
           <a:blipFill dpi="0" rotWithShape="1">
-            <a:blip r:embed="rId5">
+            <a:blip r:embed="rId6">
               <a:alphaModFix amt="39000"/>
             </a:blip>
             <a:srcRect/>
@@ -7553,7 +8023,7 @@
           <p:nvPr/>
         </p:nvPicPr>
         <p:blipFill>
-          <a:blip r:embed="rId6">
+          <a:blip r:embed="rId7">
             <a:extLst>
               <a:ext uri="{28A0092B-C50C-407E-A947-70E740481C1C}">
                 <a14:useLocalDpi xmlns:a14="http://schemas.microsoft.com/office/drawing/2010/main" val="0"/>
@@ -7737,7 +8207,7 @@
           <a:p>
             <a:fld id="{E403B45D-E03C-4404-9C98-312B8AD2E868}" type="datetime1">
               <a:rPr lang="en-US" smtClean="0"/>
-              <a:t>4/10/2015</a:t>
+              <a:t>4/13/2015</a:t>
             </a:fld>
             <a:endParaRPr lang="en-US"/>
           </a:p>
@@ -8111,6 +8581,13 @@
   <p:clrMapOvr>
     <a:masterClrMapping/>
   </p:clrMapOvr>
+  <p:timing>
+    <p:tnLst>
+      <p:par>
+        <p:cTn id="1" dur="indefinite" restart="never" nodeType="tmRoot"/>
+      </p:par>
+    </p:tnLst>
+  </p:timing>
 </p:sld>
 </file>
 
@@ -8608,7 +9085,7 @@
           <a:p>
             <a:fld id="{F1145CE5-2D07-497F-B5A3-6DE6B12B2B46}" type="datetime1">
               <a:rPr lang="en-US" smtClean="0"/>
-              <a:t>4/10/2015</a:t>
+              <a:t>4/13/2015</a:t>
             </a:fld>
             <a:endParaRPr lang="en-US"/>
           </a:p>
@@ -8980,7 +9457,7 @@
           <a:p>
             <a:fld id="{E403B45D-E03C-4404-9C98-312B8AD2E868}" type="datetime1">
               <a:rPr lang="en-US" smtClean="0"/>
-              <a:t>4/10/2015</a:t>
+              <a:t>4/13/2015</a:t>
             </a:fld>
             <a:endParaRPr lang="en-US"/>
           </a:p>
@@ -9041,7 +9518,7 @@
           <p:nvPr/>
         </p:nvPicPr>
         <p:blipFill>
-          <a:blip r:embed="rId2">
+          <a:blip r:embed="rId3">
             <a:extLst>
               <a:ext uri="{28A0092B-C50C-407E-A947-70E740481C1C}">
                 <a14:useLocalDpi xmlns:a14="http://schemas.microsoft.com/office/drawing/2010/main" val="0"/>
@@ -9212,7 +9689,7 @@
           <p:nvPr/>
         </p:nvPicPr>
         <p:blipFill>
-          <a:blip r:embed="rId3">
+          <a:blip r:embed="rId4">
             <a:extLst>
               <a:ext uri="{28A0092B-C50C-407E-A947-70E740481C1C}">
                 <a14:useLocalDpi xmlns:a14="http://schemas.microsoft.com/office/drawing/2010/main" val="0"/>
@@ -9253,7 +9730,7 @@
             <a:avLst/>
           </a:prstGeom>
           <a:blipFill dpi="0" rotWithShape="0">
-            <a:blip r:embed="rId4">
+            <a:blip r:embed="rId5">
               <a:alphaModFix amt="49000"/>
             </a:blip>
             <a:srcRect/>
@@ -9296,7 +9773,7 @@
           <p:nvPr/>
         </p:nvPicPr>
         <p:blipFill>
-          <a:blip r:embed="rId5">
+          <a:blip r:embed="rId6">
             <a:extLst>
               <a:ext uri="{28A0092B-C50C-407E-A947-70E740481C1C}">
                 <a14:useLocalDpi xmlns:a14="http://schemas.microsoft.com/office/drawing/2010/main" val="0"/>
@@ -9350,7 +9827,7 @@
           <p:nvPr/>
         </p:nvPicPr>
         <p:blipFill>
-          <a:blip r:embed="rId6">
+          <a:blip r:embed="rId7">
             <a:extLst>
               <a:ext uri="{28A0092B-C50C-407E-A947-70E740481C1C}">
                 <a14:useLocalDpi xmlns:a14="http://schemas.microsoft.com/office/drawing/2010/main" val="0"/>
@@ -9450,7 +9927,7 @@
           </p:nvPr>
         </p:nvPicPr>
         <p:blipFill>
-          <a:blip r:embed="rId2">
+          <a:blip r:embed="rId3">
             <a:extLst>
               <a:ext uri="{28A0092B-C50C-407E-A947-70E740481C1C}">
                 <a14:useLocalDpi xmlns:a14="http://schemas.microsoft.com/office/drawing/2010/main" val="0"/>
@@ -9485,7 +9962,7 @@
           <a:p>
             <a:fld id="{E403B45D-E03C-4404-9C98-312B8AD2E868}" type="datetime1">
               <a:rPr lang="en-US" smtClean="0"/>
-              <a:t>4/10/2015</a:t>
+              <a:t>4/13/2015</a:t>
             </a:fld>
             <a:endParaRPr lang="en-US"/>
           </a:p>
@@ -9546,7 +10023,7 @@
           <p:nvPr/>
         </p:nvPicPr>
         <p:blipFill>
-          <a:blip r:embed="rId3">
+          <a:blip r:embed="rId4">
             <a:extLst>
               <a:ext uri="{28A0092B-C50C-407E-A947-70E740481C1C}">
                 <a14:useLocalDpi xmlns:a14="http://schemas.microsoft.com/office/drawing/2010/main" val="0"/>
@@ -9750,7 +10227,7 @@
           <p:nvPr/>
         </p:nvPicPr>
         <p:blipFill>
-          <a:blip r:embed="rId4">
+          <a:blip r:embed="rId5">
             <a:extLst>
               <a:ext uri="{28A0092B-C50C-407E-A947-70E740481C1C}">
                 <a14:useLocalDpi xmlns:a14="http://schemas.microsoft.com/office/drawing/2010/main" val="0"/>
@@ -9830,7 +10307,7 @@
           <p:nvPr/>
         </p:nvPicPr>
         <p:blipFill>
-          <a:blip r:embed="rId5">
+          <a:blip r:embed="rId6">
             <a:extLst>
               <a:ext uri="{28A0092B-C50C-407E-A947-70E740481C1C}">
                 <a14:useLocalDpi xmlns:a14="http://schemas.microsoft.com/office/drawing/2010/main" val="0"/>
@@ -9868,7 +10345,7 @@
           <p:nvPr/>
         </p:nvPicPr>
         <p:blipFill>
-          <a:blip r:embed="rId6">
+          <a:blip r:embed="rId7">
             <a:extLst>
               <a:ext uri="{28A0092B-C50C-407E-A947-70E740481C1C}">
                 <a14:useLocalDpi xmlns:a14="http://schemas.microsoft.com/office/drawing/2010/main" val="0"/>
@@ -9989,7 +10466,7 @@
           <a:p>
             <a:fld id="{E403B45D-E03C-4404-9C98-312B8AD2E868}" type="datetime1">
               <a:rPr lang="en-US" smtClean="0"/>
-              <a:t>4/10/2015</a:t>
+              <a:t>4/13/2015</a:t>
             </a:fld>
             <a:endParaRPr lang="en-US"/>
           </a:p>
@@ -10257,6 +10734,13 @@
   <p:clrMapOvr>
     <a:masterClrMapping/>
   </p:clrMapOvr>
+  <p:timing>
+    <p:tnLst>
+      <p:par>
+        <p:cTn id="1" dur="indefinite" restart="never" nodeType="tmRoot"/>
+      </p:par>
+    </p:tnLst>
+  </p:timing>
 </p:sld>
 </file>
 
@@ -10419,15 +10903,7 @@
           <a:p>
             <a:r>
               <a:rPr lang="en-US" dirty="0" smtClean="0"/>
-              <a:t>Removes </a:t>
-            </a:r>
-            <a:r>
-              <a:rPr lang="en-US" dirty="0" smtClean="0"/>
-              <a:t>unnecessary </a:t>
-            </a:r>
-            <a:r>
-              <a:rPr lang="en-US" dirty="0" smtClean="0"/>
-              <a:t>characters such as whitespace, newline characters, comments, and some block delimiters.</a:t>
+              <a:t>Removes unnecessary characters such as whitespace, newline characters, comments, and some block delimiters.</a:t>
             </a:r>
           </a:p>
           <a:p>
@@ -10490,7 +10966,7 @@
           <a:p>
             <a:fld id="{E403B45D-E03C-4404-9C98-312B8AD2E868}" type="datetime1">
               <a:rPr lang="en-US" smtClean="0"/>
-              <a:t>4/10/2015</a:t>
+              <a:t>4/13/2015</a:t>
             </a:fld>
             <a:endParaRPr lang="en-US"/>
           </a:p>
@@ -10590,6 +11066,13 @@
   <p:clrMapOvr>
     <a:masterClrMapping/>
   </p:clrMapOvr>
+  <p:timing>
+    <p:tnLst>
+      <p:par>
+        <p:cTn id="1" dur="indefinite" restart="never" nodeType="tmRoot"/>
+      </p:par>
+    </p:tnLst>
+  </p:timing>
 </p:sld>
 </file>
 
@@ -10650,7 +11133,7 @@
           <a:p>
             <a:fld id="{E403B45D-E03C-4404-9C98-312B8AD2E868}" type="datetime1">
               <a:rPr lang="en-US" smtClean="0"/>
-              <a:t>4/10/2015</a:t>
+              <a:t>4/13/2015</a:t>
             </a:fld>
             <a:endParaRPr lang="en-US"/>
           </a:p>
@@ -10841,6 +11324,13 @@
   <p:clrMapOvr>
     <a:masterClrMapping/>
   </p:clrMapOvr>
+  <p:timing>
+    <p:tnLst>
+      <p:par>
+        <p:cTn id="1" dur="indefinite" restart="never" nodeType="tmRoot"/>
+      </p:par>
+    </p:tnLst>
+  </p:timing>
 </p:sld>
 </file>
 
@@ -11614,6 +12104,20 @@
 </EsriMapsInfo>
 </file>
 
+<file path=customXml/item42.xml><?xml version="1.0" encoding="utf-8"?>
+<EsriMapsInfo xmlns="ESRI.ArcGIS.Mapping.OfficeIntegration.PowerPointInfo">
+  <Version>Version1</Version>
+  <RequiresSignIn>False</RequiresSignIn>
+</EsriMapsInfo>
+</file>
+
+<file path=customXml/item43.xml><?xml version="1.0" encoding="utf-8"?>
+<EsriMapsInfo xmlns="ESRI.ArcGIS.Mapping.OfficeIntegration.PowerPointInfo">
+  <Version>Version1</Version>
+  <RequiresSignIn>False</RequiresSignIn>
+</EsriMapsInfo>
+</file>
+
 <file path=customXml/item5.xml><?xml version="1.0" encoding="utf-8"?>
 <EsriMapsInfo xmlns="ESRI.ArcGIS.Mapping.OfficeIntegration.PowerPointInfo">
   <Version>Version1</Version>
@@ -11650,6 +12154,38 @@
 </file>
 
 <file path=customXml/itemProps1.xml><?xml version="1.0" encoding="utf-8"?>
+<ds:datastoreItem xmlns:ds="http://schemas.openxmlformats.org/officeDocument/2006/customXml" ds:itemID="{9730E0C9-5C74-48D1-84FA-FF9B0943B0F7}">
+  <ds:schemaRefs>
+    <ds:schemaRef ds:uri="ESRI.ArcGIS.Mapping.OfficeIntegration.PowerPointInfo"/>
+  </ds:schemaRefs>
+</ds:datastoreItem>
+</file>
+
+<file path=customXml/itemProps10.xml><?xml version="1.0" encoding="utf-8"?>
+<ds:datastoreItem xmlns:ds="http://schemas.openxmlformats.org/officeDocument/2006/customXml" ds:itemID="{4653446B-1A4F-4E6E-9E77-86F6CF5DFD82}">
+  <ds:schemaRefs>
+    <ds:schemaRef ds:uri="ESRI.ArcGIS.Mapping.OfficeIntegration.PowerPointInfo"/>
+  </ds:schemaRefs>
+</ds:datastoreItem>
+</file>
+
+<file path=customXml/itemProps11.xml><?xml version="1.0" encoding="utf-8"?>
+<ds:datastoreItem xmlns:ds="http://schemas.openxmlformats.org/officeDocument/2006/customXml" ds:itemID="{928A6BAA-790D-4F1F-BECE-7C09BD898062}">
+  <ds:schemaRefs>
+    <ds:schemaRef ds:uri="ESRI.ArcGIS.Mapping.OfficeIntegration.PowerPointInfo"/>
+  </ds:schemaRefs>
+</ds:datastoreItem>
+</file>
+
+<file path=customXml/itemProps12.xml><?xml version="1.0" encoding="utf-8"?>
+<ds:datastoreItem xmlns:ds="http://schemas.openxmlformats.org/officeDocument/2006/customXml" ds:itemID="{D8A32350-3CF1-48E4-99DC-93F6339304AC}">
+  <ds:schemaRefs>
+    <ds:schemaRef ds:uri="ESRI.ArcGIS.Mapping.OfficeIntegration.PowerPointInfo"/>
+  </ds:schemaRefs>
+</ds:datastoreItem>
+</file>
+
+<file path=customXml/itemProps13.xml><?xml version="1.0" encoding="utf-8"?>
 <ds:datastoreItem xmlns:ds="http://schemas.openxmlformats.org/officeDocument/2006/customXml" ds:itemID="{83974DC6-CB2F-4517-86F2-33E59245989F}">
   <ds:schemaRefs>
     <ds:schemaRef ds:uri="ESRI.ArcGIS.Mapping.OfficeIntegration.PowerPointInfo"/>
@@ -11657,7 +12193,103 @@
 </ds:datastoreItem>
 </file>
 
-<file path=customXml/itemProps10.xml><?xml version="1.0" encoding="utf-8"?>
+<file path=customXml/itemProps14.xml><?xml version="1.0" encoding="utf-8"?>
+<ds:datastoreItem xmlns:ds="http://schemas.openxmlformats.org/officeDocument/2006/customXml" ds:itemID="{F09F0585-C5E6-4468-9701-0744CD4F4932}">
+  <ds:schemaRefs>
+    <ds:schemaRef ds:uri="ESRI.ArcGIS.Mapping.OfficeIntegration.PowerPointInfo"/>
+  </ds:schemaRefs>
+</ds:datastoreItem>
+</file>
+
+<file path=customXml/itemProps15.xml><?xml version="1.0" encoding="utf-8"?>
+<ds:datastoreItem xmlns:ds="http://schemas.openxmlformats.org/officeDocument/2006/customXml" ds:itemID="{00E1C324-B4E4-4EE6-A30B-DC7DD5A0A3B3}">
+  <ds:schemaRefs>
+    <ds:schemaRef ds:uri="ESRI.ArcGIS.Mapping.OfficeIntegration.PowerPointInfo"/>
+  </ds:schemaRefs>
+</ds:datastoreItem>
+</file>
+
+<file path=customXml/itemProps16.xml><?xml version="1.0" encoding="utf-8"?>
+<ds:datastoreItem xmlns:ds="http://schemas.openxmlformats.org/officeDocument/2006/customXml" ds:itemID="{AD63EA22-DABD-41F1-A4E5-34B37D8534FF}">
+  <ds:schemaRefs>
+    <ds:schemaRef ds:uri="ESRI.ArcGIS.Mapping.OfficeIntegration.PowerPointInfo"/>
+  </ds:schemaRefs>
+</ds:datastoreItem>
+</file>
+
+<file path=customXml/itemProps17.xml><?xml version="1.0" encoding="utf-8"?>
+<ds:datastoreItem xmlns:ds="http://schemas.openxmlformats.org/officeDocument/2006/customXml" ds:itemID="{0C0BFD7F-DBBE-403E-8CC3-D687E604BAAB}">
+  <ds:schemaRefs>
+    <ds:schemaRef ds:uri="ESRI.ArcGIS.Mapping.OfficeIntegration.PowerPointInfo"/>
+  </ds:schemaRefs>
+</ds:datastoreItem>
+</file>
+
+<file path=customXml/itemProps18.xml><?xml version="1.0" encoding="utf-8"?>
+<ds:datastoreItem xmlns:ds="http://schemas.openxmlformats.org/officeDocument/2006/customXml" ds:itemID="{9122C9B7-BB9E-425E-961E-A6F32BC00961}">
+  <ds:schemaRefs>
+    <ds:schemaRef ds:uri="ESRI.ArcGIS.Mapping.OfficeIntegration.PowerPointInfo"/>
+  </ds:schemaRefs>
+</ds:datastoreItem>
+</file>
+
+<file path=customXml/itemProps19.xml><?xml version="1.0" encoding="utf-8"?>
+<ds:datastoreItem xmlns:ds="http://schemas.openxmlformats.org/officeDocument/2006/customXml" ds:itemID="{0952A776-CA14-47CA-8E8C-F3628B9BB702}">
+  <ds:schemaRefs>
+    <ds:schemaRef ds:uri="ESRI.ArcGIS.Mapping.OfficeIntegration.PowerPointInfo"/>
+  </ds:schemaRefs>
+</ds:datastoreItem>
+</file>
+
+<file path=customXml/itemProps2.xml><?xml version="1.0" encoding="utf-8"?>
+<ds:datastoreItem xmlns:ds="http://schemas.openxmlformats.org/officeDocument/2006/customXml" ds:itemID="{27F72A04-DC93-4420-B9AA-16544E1D787F}">
+  <ds:schemaRefs>
+    <ds:schemaRef ds:uri="ESRI.ArcGIS.Mapping.OfficeIntegration.PowerPointInfo"/>
+  </ds:schemaRefs>
+</ds:datastoreItem>
+</file>
+
+<file path=customXml/itemProps20.xml><?xml version="1.0" encoding="utf-8"?>
+<ds:datastoreItem xmlns:ds="http://schemas.openxmlformats.org/officeDocument/2006/customXml" ds:itemID="{86DC43B7-A651-470F-9D9B-5DC681960331}">
+  <ds:schemaRefs>
+    <ds:schemaRef ds:uri="ESRI.ArcGIS.Mapping.OfficeIntegration.PowerPointInfo"/>
+  </ds:schemaRefs>
+</ds:datastoreItem>
+</file>
+
+<file path=customXml/itemProps21.xml><?xml version="1.0" encoding="utf-8"?>
+<ds:datastoreItem xmlns:ds="http://schemas.openxmlformats.org/officeDocument/2006/customXml" ds:itemID="{96BCEFA7-7F62-4103-ABA4-659F062669D7}">
+  <ds:schemaRefs>
+    <ds:schemaRef ds:uri="ESRI.ArcGIS.Mapping.OfficeIntegration.PowerPointInfo"/>
+  </ds:schemaRefs>
+</ds:datastoreItem>
+</file>
+
+<file path=customXml/itemProps22.xml><?xml version="1.0" encoding="utf-8"?>
+<ds:datastoreItem xmlns:ds="http://schemas.openxmlformats.org/officeDocument/2006/customXml" ds:itemID="{540CCE14-1146-4215-A3E5-6738A9581ACF}">
+  <ds:schemaRefs>
+    <ds:schemaRef ds:uri="ESRI.ArcGIS.Mapping.OfficeIntegration.PowerPointInfo"/>
+  </ds:schemaRefs>
+</ds:datastoreItem>
+</file>
+
+<file path=customXml/itemProps23.xml><?xml version="1.0" encoding="utf-8"?>
+<ds:datastoreItem xmlns:ds="http://schemas.openxmlformats.org/officeDocument/2006/customXml" ds:itemID="{23F09B40-FB7D-4EB2-86FC-27C42F6B3BAE}">
+  <ds:schemaRefs>
+    <ds:schemaRef ds:uri="ESRI.ArcGIS.Mapping.OfficeIntegration.PowerPointInfo"/>
+  </ds:schemaRefs>
+</ds:datastoreItem>
+</file>
+
+<file path=customXml/itemProps24.xml><?xml version="1.0" encoding="utf-8"?>
+<ds:datastoreItem xmlns:ds="http://schemas.openxmlformats.org/officeDocument/2006/customXml" ds:itemID="{0431B50E-6780-4CC1-8294-54F8A3D2A2DA}">
+  <ds:schemaRefs>
+    <ds:schemaRef ds:uri="ESRI.ArcGIS.Mapping.OfficeIntegration.PowerPointInfo"/>
+  </ds:schemaRefs>
+</ds:datastoreItem>
+</file>
+
+<file path=customXml/itemProps25.xml><?xml version="1.0" encoding="utf-8"?>
 <ds:datastoreItem xmlns:ds="http://schemas.openxmlformats.org/officeDocument/2006/customXml" ds:itemID="{64669553-C2C7-4A05-BDE6-5784BDC500B9}">
   <ds:schemaRefs>
     <ds:schemaRef ds:uri="ESRI.ArcGIS.Mapping.OfficeIntegration.PowerPointInfo"/>
@@ -11665,15 +12297,103 @@
 </ds:datastoreItem>
 </file>
 
-<file path=customXml/itemProps11.xml><?xml version="1.0" encoding="utf-8"?>
-<ds:datastoreItem xmlns:ds="http://schemas.openxmlformats.org/officeDocument/2006/customXml" ds:itemID="{00E1C324-B4E4-4EE6-A30B-DC7DD5A0A3B3}">
+<file path=customXml/itemProps26.xml><?xml version="1.0" encoding="utf-8"?>
+<ds:datastoreItem xmlns:ds="http://schemas.openxmlformats.org/officeDocument/2006/customXml" ds:itemID="{0377085A-A759-4413-9BB8-639DE09D4BA4}">
   <ds:schemaRefs>
     <ds:schemaRef ds:uri="ESRI.ArcGIS.Mapping.OfficeIntegration.PowerPointInfo"/>
   </ds:schemaRefs>
 </ds:datastoreItem>
 </file>
 
-<file path=customXml/itemProps12.xml><?xml version="1.0" encoding="utf-8"?>
+<file path=customXml/itemProps27.xml><?xml version="1.0" encoding="utf-8"?>
+<ds:datastoreItem xmlns:ds="http://schemas.openxmlformats.org/officeDocument/2006/customXml" ds:itemID="{87F8066A-C73F-4211-BBF8-2B75D61A5F4E}">
+  <ds:schemaRefs>
+    <ds:schemaRef ds:uri="ESRI.ArcGIS.Mapping.OfficeIntegration.PowerPointInfo"/>
+  </ds:schemaRefs>
+</ds:datastoreItem>
+</file>
+
+<file path=customXml/itemProps28.xml><?xml version="1.0" encoding="utf-8"?>
+<ds:datastoreItem xmlns:ds="http://schemas.openxmlformats.org/officeDocument/2006/customXml" ds:itemID="{58581E56-8E64-479C-BC10-3D52028645B6}">
+  <ds:schemaRefs>
+    <ds:schemaRef ds:uri="ESRI.ArcGIS.Mapping.OfficeIntegration.PowerPointInfo"/>
+  </ds:schemaRefs>
+</ds:datastoreItem>
+</file>
+
+<file path=customXml/itemProps29.xml><?xml version="1.0" encoding="utf-8"?>
+<ds:datastoreItem xmlns:ds="http://schemas.openxmlformats.org/officeDocument/2006/customXml" ds:itemID="{FCA828EF-2A69-46C1-A149-8E968648AFCC}">
+  <ds:schemaRefs>
+    <ds:schemaRef ds:uri="ESRI.ArcGIS.Mapping.OfficeIntegration.PowerPointInfo"/>
+  </ds:schemaRefs>
+</ds:datastoreItem>
+</file>
+
+<file path=customXml/itemProps3.xml><?xml version="1.0" encoding="utf-8"?>
+<ds:datastoreItem xmlns:ds="http://schemas.openxmlformats.org/officeDocument/2006/customXml" ds:itemID="{CEEB83A3-0CE5-467C-97CC-85CF0B212256}">
+  <ds:schemaRefs>
+    <ds:schemaRef ds:uri="ESRI.ArcGIS.Mapping.OfficeIntegration.PowerPointInfo"/>
+  </ds:schemaRefs>
+</ds:datastoreItem>
+</file>
+
+<file path=customXml/itemProps30.xml><?xml version="1.0" encoding="utf-8"?>
+<ds:datastoreItem xmlns:ds="http://schemas.openxmlformats.org/officeDocument/2006/customXml" ds:itemID="{B4DF1E66-6ACC-4157-9168-FDAC5054F24F}">
+  <ds:schemaRefs>
+    <ds:schemaRef ds:uri="ESRI.ArcGIS.Mapping.OfficeIntegration.PowerPointInfo"/>
+  </ds:schemaRefs>
+</ds:datastoreItem>
+</file>
+
+<file path=customXml/itemProps31.xml><?xml version="1.0" encoding="utf-8"?>
+<ds:datastoreItem xmlns:ds="http://schemas.openxmlformats.org/officeDocument/2006/customXml" ds:itemID="{8DD72995-77DA-4521-827B-4BD3BBB010F0}">
+  <ds:schemaRefs>
+    <ds:schemaRef ds:uri="ESRI.ArcGIS.Mapping.OfficeIntegration.PowerPointInfo"/>
+  </ds:schemaRefs>
+</ds:datastoreItem>
+</file>
+
+<file path=customXml/itemProps32.xml><?xml version="1.0" encoding="utf-8"?>
+<ds:datastoreItem xmlns:ds="http://schemas.openxmlformats.org/officeDocument/2006/customXml" ds:itemID="{F23DD629-EDE2-45D7-B65A-1A52D83473FE}">
+  <ds:schemaRefs>
+    <ds:schemaRef ds:uri="ESRI.ArcGIS.Mapping.OfficeIntegration.PowerPointInfo"/>
+  </ds:schemaRefs>
+</ds:datastoreItem>
+</file>
+
+<file path=customXml/itemProps33.xml><?xml version="1.0" encoding="utf-8"?>
+<ds:datastoreItem xmlns:ds="http://schemas.openxmlformats.org/officeDocument/2006/customXml" ds:itemID="{7E7A34CD-1270-4891-901E-7EE49A903375}">
+  <ds:schemaRefs>
+    <ds:schemaRef ds:uri="ESRI.ArcGIS.Mapping.OfficeIntegration.PowerPointInfo"/>
+  </ds:schemaRefs>
+</ds:datastoreItem>
+</file>
+
+<file path=customXml/itemProps34.xml><?xml version="1.0" encoding="utf-8"?>
+<ds:datastoreItem xmlns:ds="http://schemas.openxmlformats.org/officeDocument/2006/customXml" ds:itemID="{AD4BFB44-6200-429A-A4FE-9B7752513BCC}">
+  <ds:schemaRefs>
+    <ds:schemaRef ds:uri="ESRI.ArcGIS.Mapping.OfficeIntegration.PowerPointInfo"/>
+  </ds:schemaRefs>
+</ds:datastoreItem>
+</file>
+
+<file path=customXml/itemProps35.xml><?xml version="1.0" encoding="utf-8"?>
+<ds:datastoreItem xmlns:ds="http://schemas.openxmlformats.org/officeDocument/2006/customXml" ds:itemID="{A9460852-5164-4FAC-8557-C35D5DB0B8FD}">
+  <ds:schemaRefs>
+    <ds:schemaRef ds:uri="ESRI.ArcGIS.Mapping.OfficeIntegration.PowerPointInfo"/>
+  </ds:schemaRefs>
+</ds:datastoreItem>
+</file>
+
+<file path=customXml/itemProps36.xml><?xml version="1.0" encoding="utf-8"?>
+<ds:datastoreItem xmlns:ds="http://schemas.openxmlformats.org/officeDocument/2006/customXml" ds:itemID="{FA24E1D0-79A0-4D4F-BC2C-5ED533E69815}">
+  <ds:schemaRefs>
+    <ds:schemaRef ds:uri="ESRI.ArcGIS.Mapping.OfficeIntegration.PowerPointInfo"/>
+  </ds:schemaRefs>
+</ds:datastoreItem>
+</file>
+
+<file path=customXml/itemProps37.xml><?xml version="1.0" encoding="utf-8"?>
 <ds:datastoreItem xmlns:ds="http://schemas.openxmlformats.org/officeDocument/2006/customXml" ds:itemID="{782AA18B-5D17-4AD0-8334-EE1CCEA13C31}">
   <ds:schemaRefs>
     <ds:schemaRef ds:uri="ESRI.ArcGIS.Mapping.OfficeIntegration.PowerPointInfo"/>
@@ -11681,39 +12401,7 @@
 </ds:datastoreItem>
 </file>
 
-<file path=customXml/itemProps13.xml><?xml version="1.0" encoding="utf-8"?>
-<ds:datastoreItem xmlns:ds="http://schemas.openxmlformats.org/officeDocument/2006/customXml" ds:itemID="{9730E0C9-5C74-48D1-84FA-FF9B0943B0F7}">
-  <ds:schemaRefs>
-    <ds:schemaRef ds:uri="ESRI.ArcGIS.Mapping.OfficeIntegration.PowerPointInfo"/>
-  </ds:schemaRefs>
-</ds:datastoreItem>
-</file>
-
-<file path=customXml/itemProps14.xml><?xml version="1.0" encoding="utf-8"?>
-<ds:datastoreItem xmlns:ds="http://schemas.openxmlformats.org/officeDocument/2006/customXml" ds:itemID="{B4DF1E66-6ACC-4157-9168-FDAC5054F24F}">
-  <ds:schemaRefs>
-    <ds:schemaRef ds:uri="ESRI.ArcGIS.Mapping.OfficeIntegration.PowerPointInfo"/>
-  </ds:schemaRefs>
-</ds:datastoreItem>
-</file>
-
-<file path=customXml/itemProps15.xml><?xml version="1.0" encoding="utf-8"?>
-<ds:datastoreItem xmlns:ds="http://schemas.openxmlformats.org/officeDocument/2006/customXml" ds:itemID="{96BCEFA7-7F62-4103-ABA4-659F062669D7}">
-  <ds:schemaRefs>
-    <ds:schemaRef ds:uri="ESRI.ArcGIS.Mapping.OfficeIntegration.PowerPointInfo"/>
-  </ds:schemaRefs>
-</ds:datastoreItem>
-</file>
-
-<file path=customXml/itemProps16.xml><?xml version="1.0" encoding="utf-8"?>
-<ds:datastoreItem xmlns:ds="http://schemas.openxmlformats.org/officeDocument/2006/customXml" ds:itemID="{56FE11E1-D6FB-43BB-B924-E2D84E8F5C1F}">
-  <ds:schemaRefs>
-    <ds:schemaRef ds:uri="ESRI.ArcGIS.Mapping.OfficeIntegration.PowerPointInfo"/>
-  </ds:schemaRefs>
-</ds:datastoreItem>
-</file>
-
-<file path=customXml/itemProps17.xml><?xml version="1.0" encoding="utf-8"?>
+<file path=customXml/itemProps38.xml><?xml version="1.0" encoding="utf-8"?>
 <ds:datastoreItem xmlns:ds="http://schemas.openxmlformats.org/officeDocument/2006/customXml" ds:itemID="{A2D91898-2C69-4203-B96D-7244D52798AC}">
   <ds:schemaRefs>
     <ds:schemaRef ds:uri="ESRI.ArcGIS.Mapping.OfficeIntegration.PowerPointInfo"/>
@@ -11721,39 +12409,55 @@
 </ds:datastoreItem>
 </file>
 
-<file path=customXml/itemProps18.xml><?xml version="1.0" encoding="utf-8"?>
-<ds:datastoreItem xmlns:ds="http://schemas.openxmlformats.org/officeDocument/2006/customXml" ds:itemID="{27F72A04-DC93-4420-B9AA-16544E1D787F}">
+<file path=customXml/itemProps39.xml><?xml version="1.0" encoding="utf-8"?>
+<ds:datastoreItem xmlns:ds="http://schemas.openxmlformats.org/officeDocument/2006/customXml" ds:itemID="{4D0FF0A2-5A08-4E00-8A6C-45A3FC7EC409}">
   <ds:schemaRefs>
     <ds:schemaRef ds:uri="ESRI.ArcGIS.Mapping.OfficeIntegration.PowerPointInfo"/>
   </ds:schemaRefs>
 </ds:datastoreItem>
 </file>
 
-<file path=customXml/itemProps19.xml><?xml version="1.0" encoding="utf-8"?>
-<ds:datastoreItem xmlns:ds="http://schemas.openxmlformats.org/officeDocument/2006/customXml" ds:itemID="{0377085A-A759-4413-9BB8-639DE09D4BA4}">
+<file path=customXml/itemProps4.xml><?xml version="1.0" encoding="utf-8"?>
+<ds:datastoreItem xmlns:ds="http://schemas.openxmlformats.org/officeDocument/2006/customXml" ds:itemID="{C15A61A2-FD38-4F9C-9700-5BD05E348FBC}">
   <ds:schemaRefs>
     <ds:schemaRef ds:uri="ESRI.ArcGIS.Mapping.OfficeIntegration.PowerPointInfo"/>
   </ds:schemaRefs>
 </ds:datastoreItem>
 </file>
 
-<file path=customXml/itemProps2.xml><?xml version="1.0" encoding="utf-8"?>
-<ds:datastoreItem xmlns:ds="http://schemas.openxmlformats.org/officeDocument/2006/customXml" ds:itemID="{F8E7C3E6-C19D-42D0-B945-70D19F2AC60A}">
+<file path=customXml/itemProps40.xml><?xml version="1.0" encoding="utf-8"?>
+<ds:datastoreItem xmlns:ds="http://schemas.openxmlformats.org/officeDocument/2006/customXml" ds:itemID="{24618B94-7520-442D-858F-D581437D99B4}">
   <ds:schemaRefs>
     <ds:schemaRef ds:uri="ESRI.ArcGIS.Mapping.OfficeIntegration.PowerPointInfo"/>
   </ds:schemaRefs>
 </ds:datastoreItem>
 </file>
 
-<file path=customXml/itemProps20.xml><?xml version="1.0" encoding="utf-8"?>
-<ds:datastoreItem xmlns:ds="http://schemas.openxmlformats.org/officeDocument/2006/customXml" ds:itemID="{4653446B-1A4F-4E6E-9E77-86F6CF5DFD82}">
+<file path=customXml/itemProps41.xml><?xml version="1.0" encoding="utf-8"?>
+<ds:datastoreItem xmlns:ds="http://schemas.openxmlformats.org/officeDocument/2006/customXml" ds:itemID="{839FF567-9385-4072-BE8E-5A95B5D2DB22}">
   <ds:schemaRefs>
     <ds:schemaRef ds:uri="ESRI.ArcGIS.Mapping.OfficeIntegration.PowerPointInfo"/>
   </ds:schemaRefs>
 </ds:datastoreItem>
 </file>
 
-<file path=customXml/itemProps21.xml><?xml version="1.0" encoding="utf-8"?>
+<file path=customXml/itemProps42.xml><?xml version="1.0" encoding="utf-8"?>
+<ds:datastoreItem xmlns:ds="http://schemas.openxmlformats.org/officeDocument/2006/customXml" ds:itemID="{5FF9A27B-6208-4E08-B8E9-D7B065964FA8}">
+  <ds:schemaRefs>
+    <ds:schemaRef ds:uri="ESRI.ArcGIS.Mapping.OfficeIntegration.PowerPointInfo"/>
+  </ds:schemaRefs>
+</ds:datastoreItem>
+</file>
+
+<file path=customXml/itemProps43.xml><?xml version="1.0" encoding="utf-8"?>
+<ds:datastoreItem xmlns:ds="http://schemas.openxmlformats.org/officeDocument/2006/customXml" ds:itemID="{D8775224-10B5-4B78-86A0-52415DB4EC1D}">
+  <ds:schemaRefs>
+    <ds:schemaRef ds:uri="ESRI.ArcGIS.Mapping.OfficeIntegration.PowerPointInfo"/>
+  </ds:schemaRefs>
+</ds:datastoreItem>
+</file>
+
+<file path=customXml/itemProps5.xml><?xml version="1.0" encoding="utf-8"?>
 <ds:datastoreItem xmlns:ds="http://schemas.openxmlformats.org/officeDocument/2006/customXml" ds:itemID="{0B03EEBA-7331-46BB-A922-0167D17802B9}">
   <ds:schemaRefs>
     <ds:schemaRef ds:uri="ESRI.ArcGIS.Mapping.OfficeIntegration.PowerPointInfo"/>
@@ -11761,192 +12465,8 @@
 </ds:datastoreItem>
 </file>
 
-<file path=customXml/itemProps22.xml><?xml version="1.0" encoding="utf-8"?>
-<ds:datastoreItem xmlns:ds="http://schemas.openxmlformats.org/officeDocument/2006/customXml" ds:itemID="{8DD72995-77DA-4521-827B-4BD3BBB010F0}">
-  <ds:schemaRefs>
-    <ds:schemaRef ds:uri="ESRI.ArcGIS.Mapping.OfficeIntegration.PowerPointInfo"/>
-  </ds:schemaRefs>
-</ds:datastoreItem>
-</file>
-
-<file path=customXml/itemProps23.xml><?xml version="1.0" encoding="utf-8"?>
-<ds:datastoreItem xmlns:ds="http://schemas.openxmlformats.org/officeDocument/2006/customXml" ds:itemID="{540CCE14-1146-4215-A3E5-6738A9581ACF}">
-  <ds:schemaRefs>
-    <ds:schemaRef ds:uri="ESRI.ArcGIS.Mapping.OfficeIntegration.PowerPointInfo"/>
-  </ds:schemaRefs>
-</ds:datastoreItem>
-</file>
-
-<file path=customXml/itemProps24.xml><?xml version="1.0" encoding="utf-8"?>
-<ds:datastoreItem xmlns:ds="http://schemas.openxmlformats.org/officeDocument/2006/customXml" ds:itemID="{AD63EA22-DABD-41F1-A4E5-34B37D8534FF}">
-  <ds:schemaRefs>
-    <ds:schemaRef ds:uri="ESRI.ArcGIS.Mapping.OfficeIntegration.PowerPointInfo"/>
-  </ds:schemaRefs>
-</ds:datastoreItem>
-</file>
-
-<file path=customXml/itemProps25.xml><?xml version="1.0" encoding="utf-8"?>
-<ds:datastoreItem xmlns:ds="http://schemas.openxmlformats.org/officeDocument/2006/customXml" ds:itemID="{4D0FF0A2-5A08-4E00-8A6C-45A3FC7EC409}">
-  <ds:schemaRefs>
-    <ds:schemaRef ds:uri="ESRI.ArcGIS.Mapping.OfficeIntegration.PowerPointInfo"/>
-  </ds:schemaRefs>
-</ds:datastoreItem>
-</file>
-
-<file path=customXml/itemProps26.xml><?xml version="1.0" encoding="utf-8"?>
-<ds:datastoreItem xmlns:ds="http://schemas.openxmlformats.org/officeDocument/2006/customXml" ds:itemID="{CEEB83A3-0CE5-467C-97CC-85CF0B212256}">
-  <ds:schemaRefs>
-    <ds:schemaRef ds:uri="ESRI.ArcGIS.Mapping.OfficeIntegration.PowerPointInfo"/>
-  </ds:schemaRefs>
-</ds:datastoreItem>
-</file>
-
-<file path=customXml/itemProps27.xml><?xml version="1.0" encoding="utf-8"?>
-<ds:datastoreItem xmlns:ds="http://schemas.openxmlformats.org/officeDocument/2006/customXml" ds:itemID="{F23DD629-EDE2-45D7-B65A-1A52D83473FE}">
-  <ds:schemaRefs>
-    <ds:schemaRef ds:uri="ESRI.ArcGIS.Mapping.OfficeIntegration.PowerPointInfo"/>
-  </ds:schemaRefs>
-</ds:datastoreItem>
-</file>
-
-<file path=customXml/itemProps28.xml><?xml version="1.0" encoding="utf-8"?>
-<ds:datastoreItem xmlns:ds="http://schemas.openxmlformats.org/officeDocument/2006/customXml" ds:itemID="{23F09B40-FB7D-4EB2-86FC-27C42F6B3BAE}">
-  <ds:schemaRefs>
-    <ds:schemaRef ds:uri="ESRI.ArcGIS.Mapping.OfficeIntegration.PowerPointInfo"/>
-  </ds:schemaRefs>
-</ds:datastoreItem>
-</file>
-
-<file path=customXml/itemProps29.xml><?xml version="1.0" encoding="utf-8"?>
-<ds:datastoreItem xmlns:ds="http://schemas.openxmlformats.org/officeDocument/2006/customXml" ds:itemID="{928A6BAA-790D-4F1F-BECE-7C09BD898062}">
-  <ds:schemaRefs>
-    <ds:schemaRef ds:uri="ESRI.ArcGIS.Mapping.OfficeIntegration.PowerPointInfo"/>
-  </ds:schemaRefs>
-</ds:datastoreItem>
-</file>
-
-<file path=customXml/itemProps3.xml><?xml version="1.0" encoding="utf-8"?>
-<ds:datastoreItem xmlns:ds="http://schemas.openxmlformats.org/officeDocument/2006/customXml" ds:itemID="{FA24E1D0-79A0-4D4F-BC2C-5ED533E69815}">
-  <ds:schemaRefs>
-    <ds:schemaRef ds:uri="ESRI.ArcGIS.Mapping.OfficeIntegration.PowerPointInfo"/>
-  </ds:schemaRefs>
-</ds:datastoreItem>
-</file>
-
-<file path=customXml/itemProps30.xml><?xml version="1.0" encoding="utf-8"?>
-<ds:datastoreItem xmlns:ds="http://schemas.openxmlformats.org/officeDocument/2006/customXml" ds:itemID="{7E7A34CD-1270-4891-901E-7EE49A903375}">
-  <ds:schemaRefs>
-    <ds:schemaRef ds:uri="ESRI.ArcGIS.Mapping.OfficeIntegration.PowerPointInfo"/>
-  </ds:schemaRefs>
-</ds:datastoreItem>
-</file>
-
-<file path=customXml/itemProps31.xml><?xml version="1.0" encoding="utf-8"?>
-<ds:datastoreItem xmlns:ds="http://schemas.openxmlformats.org/officeDocument/2006/customXml" ds:itemID="{87F8066A-C73F-4211-BBF8-2B75D61A5F4E}">
-  <ds:schemaRefs>
-    <ds:schemaRef ds:uri="ESRI.ArcGIS.Mapping.OfficeIntegration.PowerPointInfo"/>
-  </ds:schemaRefs>
-</ds:datastoreItem>
-</file>
-
-<file path=customXml/itemProps32.xml><?xml version="1.0" encoding="utf-8"?>
-<ds:datastoreItem xmlns:ds="http://schemas.openxmlformats.org/officeDocument/2006/customXml" ds:itemID="{0C0BFD7F-DBBE-403E-8CC3-D687E604BAAB}">
-  <ds:schemaRefs>
-    <ds:schemaRef ds:uri="ESRI.ArcGIS.Mapping.OfficeIntegration.PowerPointInfo"/>
-  </ds:schemaRefs>
-</ds:datastoreItem>
-</file>
-
-<file path=customXml/itemProps33.xml><?xml version="1.0" encoding="utf-8"?>
-<ds:datastoreItem xmlns:ds="http://schemas.openxmlformats.org/officeDocument/2006/customXml" ds:itemID="{24618B94-7520-442D-858F-D581437D99B4}">
-  <ds:schemaRefs>
-    <ds:schemaRef ds:uri="ESRI.ArcGIS.Mapping.OfficeIntegration.PowerPointInfo"/>
-  </ds:schemaRefs>
-</ds:datastoreItem>
-</file>
-
-<file path=customXml/itemProps34.xml><?xml version="1.0" encoding="utf-8"?>
+<file path=customXml/itemProps6.xml><?xml version="1.0" encoding="utf-8"?>
 <ds:datastoreItem xmlns:ds="http://schemas.openxmlformats.org/officeDocument/2006/customXml" ds:itemID="{04A8E672-C7F5-4701-83FF-060A750AB340}">
-  <ds:schemaRefs>
-    <ds:schemaRef ds:uri="ESRI.ArcGIS.Mapping.OfficeIntegration.PowerPointInfo"/>
-  </ds:schemaRefs>
-</ds:datastoreItem>
-</file>
-
-<file path=customXml/itemProps35.xml><?xml version="1.0" encoding="utf-8"?>
-<ds:datastoreItem xmlns:ds="http://schemas.openxmlformats.org/officeDocument/2006/customXml" ds:itemID="{AD4BFB44-6200-429A-A4FE-9B7752513BCC}">
-  <ds:schemaRefs>
-    <ds:schemaRef ds:uri="ESRI.ArcGIS.Mapping.OfficeIntegration.PowerPointInfo"/>
-  </ds:schemaRefs>
-</ds:datastoreItem>
-</file>
-
-<file path=customXml/itemProps36.xml><?xml version="1.0" encoding="utf-8"?>
-<ds:datastoreItem xmlns:ds="http://schemas.openxmlformats.org/officeDocument/2006/customXml" ds:itemID="{0431B50E-6780-4CC1-8294-54F8A3D2A2DA}">
-  <ds:schemaRefs>
-    <ds:schemaRef ds:uri="ESRI.ArcGIS.Mapping.OfficeIntegration.PowerPointInfo"/>
-  </ds:schemaRefs>
-</ds:datastoreItem>
-</file>
-
-<file path=customXml/itemProps37.xml><?xml version="1.0" encoding="utf-8"?>
-<ds:datastoreItem xmlns:ds="http://schemas.openxmlformats.org/officeDocument/2006/customXml" ds:itemID="{9122C9B7-BB9E-425E-961E-A6F32BC00961}">
-  <ds:schemaRefs>
-    <ds:schemaRef ds:uri="ESRI.ArcGIS.Mapping.OfficeIntegration.PowerPointInfo"/>
-  </ds:schemaRefs>
-</ds:datastoreItem>
-</file>
-
-<file path=customXml/itemProps38.xml><?xml version="1.0" encoding="utf-8"?>
-<ds:datastoreItem xmlns:ds="http://schemas.openxmlformats.org/officeDocument/2006/customXml" ds:itemID="{F9DB48C3-E10F-4BA7-B8C2-A960DB87906F}">
-  <ds:schemaRefs>
-    <ds:schemaRef ds:uri="ESRI.ArcGIS.Mapping.OfficeIntegration.PowerPointInfo"/>
-  </ds:schemaRefs>
-</ds:datastoreItem>
-</file>
-
-<file path=customXml/itemProps39.xml><?xml version="1.0" encoding="utf-8"?>
-<ds:datastoreItem xmlns:ds="http://schemas.openxmlformats.org/officeDocument/2006/customXml" ds:itemID="{C15A61A2-FD38-4F9C-9700-5BD05E348FBC}">
-  <ds:schemaRefs>
-    <ds:schemaRef ds:uri="ESRI.ArcGIS.Mapping.OfficeIntegration.PowerPointInfo"/>
-  </ds:schemaRefs>
-</ds:datastoreItem>
-</file>
-
-<file path=customXml/itemProps4.xml><?xml version="1.0" encoding="utf-8"?>
-<ds:datastoreItem xmlns:ds="http://schemas.openxmlformats.org/officeDocument/2006/customXml" ds:itemID="{58581E56-8E64-479C-BC10-3D52028645B6}">
-  <ds:schemaRefs>
-    <ds:schemaRef ds:uri="ESRI.ArcGIS.Mapping.OfficeIntegration.PowerPointInfo"/>
-  </ds:schemaRefs>
-</ds:datastoreItem>
-</file>
-
-<file path=customXml/itemProps40.xml><?xml version="1.0" encoding="utf-8"?>
-<ds:datastoreItem xmlns:ds="http://schemas.openxmlformats.org/officeDocument/2006/customXml" ds:itemID="{0952A776-CA14-47CA-8E8C-F3628B9BB702}">
-  <ds:schemaRefs>
-    <ds:schemaRef ds:uri="ESRI.ArcGIS.Mapping.OfficeIntegration.PowerPointInfo"/>
-  </ds:schemaRefs>
-</ds:datastoreItem>
-</file>
-
-<file path=customXml/itemProps41.xml><?xml version="1.0" encoding="utf-8"?>
-<ds:datastoreItem xmlns:ds="http://schemas.openxmlformats.org/officeDocument/2006/customXml" ds:itemID="{D8A32350-3CF1-48E4-99DC-93F6339304AC}">
-  <ds:schemaRefs>
-    <ds:schemaRef ds:uri="ESRI.ArcGIS.Mapping.OfficeIntegration.PowerPointInfo"/>
-  </ds:schemaRefs>
-</ds:datastoreItem>
-</file>
-
-<file path=customXml/itemProps5.xml><?xml version="1.0" encoding="utf-8"?>
-<ds:datastoreItem xmlns:ds="http://schemas.openxmlformats.org/officeDocument/2006/customXml" ds:itemID="{86DC43B7-A651-470F-9D9B-5DC681960331}">
-  <ds:schemaRefs>
-    <ds:schemaRef ds:uri="ESRI.ArcGIS.Mapping.OfficeIntegration.PowerPointInfo"/>
-  </ds:schemaRefs>
-</ds:datastoreItem>
-</file>
-
-<file path=customXml/itemProps6.xml><?xml version="1.0" encoding="utf-8"?>
-<ds:datastoreItem xmlns:ds="http://schemas.openxmlformats.org/officeDocument/2006/customXml" ds:itemID="{F09F0585-C5E6-4468-9701-0744CD4F4932}">
   <ds:schemaRefs>
     <ds:schemaRef ds:uri="ESRI.ArcGIS.Mapping.OfficeIntegration.PowerPointInfo"/>
   </ds:schemaRefs>
@@ -11962,7 +12482,7 @@
 </file>
 
 <file path=customXml/itemProps8.xml><?xml version="1.0" encoding="utf-8"?>
-<ds:datastoreItem xmlns:ds="http://schemas.openxmlformats.org/officeDocument/2006/customXml" ds:itemID="{A9460852-5164-4FAC-8557-C35D5DB0B8FD}">
+<ds:datastoreItem xmlns:ds="http://schemas.openxmlformats.org/officeDocument/2006/customXml" ds:itemID="{F8E7C3E6-C19D-42D0-B945-70D19F2AC60A}">
   <ds:schemaRefs>
     <ds:schemaRef ds:uri="ESRI.ArcGIS.Mapping.OfficeIntegration.PowerPointInfo"/>
   </ds:schemaRefs>
@@ -11970,7 +12490,7 @@
 </file>
 
 <file path=customXml/itemProps9.xml><?xml version="1.0" encoding="utf-8"?>
-<ds:datastoreItem xmlns:ds="http://schemas.openxmlformats.org/officeDocument/2006/customXml" ds:itemID="{FCA828EF-2A69-46C1-A149-8E968648AFCC}">
+<ds:datastoreItem xmlns:ds="http://schemas.openxmlformats.org/officeDocument/2006/customXml" ds:itemID="{56FE11E1-D6FB-43BB-B924-E2D84E8F5C1F}">
   <ds:schemaRefs>
     <ds:schemaRef ds:uri="ESRI.ArcGIS.Mapping.OfficeIntegration.PowerPointInfo"/>
   </ds:schemaRefs>

</xml_diff>